<commit_message>
add supp pages of ppt
</commit_message>
<xml_diff>
--- a/docs/1081_bioinformatics_FP_group4.pptx
+++ b/docs/1081_bioinformatics_FP_group4.pptx
@@ -5,10 +5,10 @@
     <p:sldMasterId id="2147483648" r:id="rId1"/>
   </p:sldMasterIdLst>
   <p:notesMasterIdLst>
-    <p:notesMasterId r:id="rId23"/>
+    <p:notesMasterId r:id="rId31"/>
   </p:notesMasterIdLst>
   <p:handoutMasterIdLst>
-    <p:handoutMasterId r:id="rId24"/>
+    <p:handoutMasterId r:id="rId32"/>
   </p:handoutMasterIdLst>
   <p:sldIdLst>
     <p:sldId id="353" r:id="rId2"/>
@@ -30,11 +30,19 @@
     <p:sldId id="284" r:id="rId18"/>
     <p:sldId id="367" r:id="rId19"/>
     <p:sldId id="306" r:id="rId20"/>
-    <p:sldId id="369" r:id="rId21"/>
-    <p:sldId id="299" r:id="rId22"/>
+    <p:sldId id="371" r:id="rId21"/>
+    <p:sldId id="372" r:id="rId22"/>
+    <p:sldId id="373" r:id="rId23"/>
+    <p:sldId id="374" r:id="rId24"/>
+    <p:sldId id="277" r:id="rId25"/>
+    <p:sldId id="282" r:id="rId26"/>
+    <p:sldId id="278" r:id="rId27"/>
+    <p:sldId id="281" r:id="rId28"/>
+    <p:sldId id="369" r:id="rId29"/>
+    <p:sldId id="299" r:id="rId30"/>
   </p:sldIdLst>
   <p:sldSz cx="12192000" cy="6858000"/>
-  <p:notesSz cx="6858000" cy="9144000"/>
+  <p:notesSz cx="7104063" cy="10234613"/>
   <p:defaultTextStyle>
     <a:defPPr>
       <a:defRPr lang="en-US"/>
@@ -176,17 +184,17 @@
         <p:spPr>
           <a:xfrm>
             <a:off x="0" y="0"/>
-            <a:ext cx="2971800" cy="458788"/>
+            <a:ext cx="3078427" cy="513508"/>
           </a:xfrm>
           <a:prstGeom prst="rect">
             <a:avLst/>
           </a:prstGeom>
         </p:spPr>
         <p:txBody>
-          <a:bodyPr vert="horz" lIns="91440" tIns="45720" rIns="91440" bIns="45720" rtlCol="0"/>
+          <a:bodyPr vert="horz" lIns="99075" tIns="49538" rIns="99075" bIns="49538" rtlCol="0"/>
           <a:lstStyle>
             <a:lvl1pPr algn="l">
-              <a:defRPr sz="1200"/>
+              <a:defRPr sz="1300"/>
             </a:lvl1pPr>
           </a:lstStyle>
           <a:p>
@@ -206,18 +214,18 @@
         </p:nvSpPr>
         <p:spPr>
           <a:xfrm>
-            <a:off x="3884613" y="0"/>
-            <a:ext cx="2971800" cy="458788"/>
+            <a:off x="4023992" y="0"/>
+            <a:ext cx="3078427" cy="513508"/>
           </a:xfrm>
           <a:prstGeom prst="rect">
             <a:avLst/>
           </a:prstGeom>
         </p:spPr>
         <p:txBody>
-          <a:bodyPr vert="horz" lIns="91440" tIns="45720" rIns="91440" bIns="45720" rtlCol="0"/>
+          <a:bodyPr vert="horz" lIns="99075" tIns="49538" rIns="99075" bIns="49538" rtlCol="0"/>
           <a:lstStyle>
             <a:lvl1pPr algn="r">
-              <a:defRPr sz="1200"/>
+              <a:defRPr sz="1300"/>
             </a:lvl1pPr>
           </a:lstStyle>
           <a:p>
@@ -241,18 +249,18 @@
         </p:nvSpPr>
         <p:spPr>
           <a:xfrm>
-            <a:off x="0" y="8685213"/>
-            <a:ext cx="2971800" cy="458787"/>
+            <a:off x="0" y="9721107"/>
+            <a:ext cx="3078427" cy="513507"/>
           </a:xfrm>
           <a:prstGeom prst="rect">
             <a:avLst/>
           </a:prstGeom>
         </p:spPr>
         <p:txBody>
-          <a:bodyPr vert="horz" lIns="91440" tIns="45720" rIns="91440" bIns="45720" rtlCol="0" anchor="b"/>
+          <a:bodyPr vert="horz" lIns="99075" tIns="49538" rIns="99075" bIns="49538" rtlCol="0" anchor="b"/>
           <a:lstStyle>
             <a:lvl1pPr algn="l">
-              <a:defRPr sz="1200"/>
+              <a:defRPr sz="1300"/>
             </a:lvl1pPr>
           </a:lstStyle>
           <a:p>
@@ -272,18 +280,18 @@
         </p:nvSpPr>
         <p:spPr>
           <a:xfrm>
-            <a:off x="3884613" y="8685213"/>
-            <a:ext cx="2971800" cy="458787"/>
+            <a:off x="4023992" y="9721107"/>
+            <a:ext cx="3078427" cy="513507"/>
           </a:xfrm>
           <a:prstGeom prst="rect">
             <a:avLst/>
           </a:prstGeom>
         </p:spPr>
         <p:txBody>
-          <a:bodyPr vert="horz" lIns="91440" tIns="45720" rIns="91440" bIns="45720" rtlCol="0" anchor="b"/>
+          <a:bodyPr vert="horz" lIns="99075" tIns="49538" rIns="99075" bIns="49538" rtlCol="0" anchor="b"/>
           <a:lstStyle>
             <a:lvl1pPr algn="r">
-              <a:defRPr sz="1200"/>
+              <a:defRPr sz="1300"/>
             </a:lvl1pPr>
           </a:lstStyle>
           <a:p>
@@ -341,17 +349,17 @@
         <p:spPr>
           <a:xfrm>
             <a:off x="0" y="0"/>
-            <a:ext cx="2971800" cy="458788"/>
+            <a:ext cx="3078427" cy="513508"/>
           </a:xfrm>
           <a:prstGeom prst="rect">
             <a:avLst/>
           </a:prstGeom>
         </p:spPr>
         <p:txBody>
-          <a:bodyPr vert="horz" lIns="91440" tIns="45720" rIns="91440" bIns="45720" rtlCol="0"/>
+          <a:bodyPr vert="horz" lIns="99075" tIns="49538" rIns="99075" bIns="49538" rtlCol="0"/>
           <a:lstStyle>
             <a:lvl1pPr algn="l">
-              <a:defRPr sz="1200"/>
+              <a:defRPr sz="1300"/>
             </a:lvl1pPr>
           </a:lstStyle>
           <a:p>
@@ -371,18 +379,18 @@
         </p:nvSpPr>
         <p:spPr>
           <a:xfrm>
-            <a:off x="3884613" y="0"/>
-            <a:ext cx="2971800" cy="458788"/>
+            <a:off x="4023992" y="0"/>
+            <a:ext cx="3078427" cy="513508"/>
           </a:xfrm>
           <a:prstGeom prst="rect">
             <a:avLst/>
           </a:prstGeom>
         </p:spPr>
         <p:txBody>
-          <a:bodyPr vert="horz" lIns="91440" tIns="45720" rIns="91440" bIns="45720" rtlCol="0"/>
+          <a:bodyPr vert="horz" lIns="99075" tIns="49538" rIns="99075" bIns="49538" rtlCol="0"/>
           <a:lstStyle>
             <a:lvl1pPr algn="r">
-              <a:defRPr sz="1200"/>
+              <a:defRPr sz="1300"/>
             </a:lvl1pPr>
           </a:lstStyle>
           <a:p>
@@ -406,8 +414,8 @@
         </p:nvSpPr>
         <p:spPr>
           <a:xfrm>
-            <a:off x="685800" y="1143000"/>
-            <a:ext cx="5486400" cy="3086100"/>
+            <a:off x="482600" y="1279525"/>
+            <a:ext cx="6140450" cy="3454400"/>
           </a:xfrm>
           <a:prstGeom prst="rect">
             <a:avLst/>
@@ -420,7 +428,7 @@
           </a:ln>
         </p:spPr>
         <p:txBody>
-          <a:bodyPr vert="horz" lIns="91440" tIns="45720" rIns="91440" bIns="45720" rtlCol="0" anchor="ctr"/>
+          <a:bodyPr vert="horz" lIns="99075" tIns="49538" rIns="99075" bIns="49538" rtlCol="0" anchor="ctr"/>
           <a:lstStyle/>
           <a:p>
             <a:endParaRPr lang="en-US"/>
@@ -439,15 +447,15 @@
         </p:nvSpPr>
         <p:spPr>
           <a:xfrm>
-            <a:off x="685800" y="4400550"/>
-            <a:ext cx="5486400" cy="3600450"/>
+            <a:off x="710407" y="4925407"/>
+            <a:ext cx="5683250" cy="4029879"/>
           </a:xfrm>
           <a:prstGeom prst="rect">
             <a:avLst/>
           </a:prstGeom>
         </p:spPr>
         <p:txBody>
-          <a:bodyPr vert="horz" lIns="91440" tIns="45720" rIns="91440" bIns="45720" rtlCol="0"/>
+          <a:bodyPr vert="horz" lIns="99075" tIns="49538" rIns="99075" bIns="49538" rtlCol="0"/>
           <a:lstStyle/>
           <a:p>
             <a:pPr lvl="0"/>
@@ -498,18 +506,18 @@
         </p:nvSpPr>
         <p:spPr>
           <a:xfrm>
-            <a:off x="0" y="8685213"/>
-            <a:ext cx="2971800" cy="458787"/>
+            <a:off x="0" y="9721107"/>
+            <a:ext cx="3078427" cy="513507"/>
           </a:xfrm>
           <a:prstGeom prst="rect">
             <a:avLst/>
           </a:prstGeom>
         </p:spPr>
         <p:txBody>
-          <a:bodyPr vert="horz" lIns="91440" tIns="45720" rIns="91440" bIns="45720" rtlCol="0" anchor="b"/>
+          <a:bodyPr vert="horz" lIns="99075" tIns="49538" rIns="99075" bIns="49538" rtlCol="0" anchor="b"/>
           <a:lstStyle>
             <a:lvl1pPr algn="l">
-              <a:defRPr sz="1200"/>
+              <a:defRPr sz="1300"/>
             </a:lvl1pPr>
           </a:lstStyle>
           <a:p>
@@ -529,18 +537,18 @@
         </p:nvSpPr>
         <p:spPr>
           <a:xfrm>
-            <a:off x="3884613" y="8685213"/>
-            <a:ext cx="2971800" cy="458787"/>
+            <a:off x="4023992" y="9721107"/>
+            <a:ext cx="3078427" cy="513507"/>
           </a:xfrm>
           <a:prstGeom prst="rect">
             <a:avLst/>
           </a:prstGeom>
         </p:spPr>
         <p:txBody>
-          <a:bodyPr vert="horz" lIns="91440" tIns="45720" rIns="91440" bIns="45720" rtlCol="0" anchor="b"/>
+          <a:bodyPr vert="horz" lIns="99075" tIns="49538" rIns="99075" bIns="49538" rtlCol="0" anchor="b"/>
           <a:lstStyle>
             <a:lvl1pPr algn="r">
-              <a:defRPr sz="1200"/>
+              <a:defRPr sz="1300"/>
             </a:lvl1pPr>
           </a:lstStyle>
           <a:p>
@@ -739,6 +747,262 @@
 </p:notes>
 </file>
 
+<file path=ppt/notesSlides/notesSlide10.xml><?xml version="1.0" encoding="utf-8"?>
+<p:notes xmlns:a="http://schemas.openxmlformats.org/drawingml/2006/main" xmlns:r="http://schemas.openxmlformats.org/officeDocument/2006/relationships" xmlns:p="http://schemas.openxmlformats.org/presentationml/2006/main">
+  <p:cSld>
+    <p:spTree>
+      <p:nvGrpSpPr>
+        <p:cNvPr id="1" name=""/>
+        <p:cNvGrpSpPr/>
+        <p:nvPr/>
+      </p:nvGrpSpPr>
+      <p:grpSpPr>
+        <a:xfrm>
+          <a:off x="0" y="0"/>
+          <a:ext cx="0" cy="0"/>
+          <a:chOff x="0" y="0"/>
+          <a:chExt cx="0" cy="0"/>
+        </a:xfrm>
+      </p:grpSpPr>
+      <p:sp>
+        <p:nvSpPr>
+          <p:cNvPr id="2" name="投影片影像版面配置區 1"/>
+          <p:cNvSpPr>
+            <a:spLocks noGrp="1" noRot="1" noChangeAspect="1"/>
+          </p:cNvSpPr>
+          <p:nvPr>
+            <p:ph type="sldImg"/>
+          </p:nvPr>
+        </p:nvSpPr>
+        <p:spPr/>
+      </p:sp>
+      <p:sp>
+        <p:nvSpPr>
+          <p:cNvPr id="3" name="備忘稿版面配置區 2"/>
+          <p:cNvSpPr>
+            <a:spLocks noGrp="1"/>
+          </p:cNvSpPr>
+          <p:nvPr>
+            <p:ph type="body" idx="1"/>
+          </p:nvPr>
+        </p:nvSpPr>
+        <p:spPr/>
+        <p:txBody>
+          <a:bodyPr/>
+          <a:lstStyle/>
+          <a:p>
+            <a:r>
+              <a:rPr lang="en-US" altLang="zh-TW" sz="1200" b="0" i="0" kern="1200" dirty="0">
+                <a:solidFill>
+                  <a:schemeClr val="tx1"/>
+                </a:solidFill>
+                <a:effectLst/>
+                <a:latin typeface="+mn-lt"/>
+                <a:ea typeface="+mn-ea"/>
+                <a:cs typeface="+mn-cs"/>
+              </a:rPr>
+              <a:t>Here each 100-kb locus in </a:t>
+            </a:r>
+            <a:r>
+              <a:rPr lang="en-US" altLang="zh-TW" sz="1200" b="0" i="1" kern="1200" dirty="0">
+                <a:solidFill>
+                  <a:schemeClr val="tx1"/>
+                </a:solidFill>
+                <a:effectLst/>
+                <a:latin typeface="+mn-lt"/>
+                <a:ea typeface="+mn-ea"/>
+                <a:cs typeface="+mn-cs"/>
+              </a:rPr>
+              <a:t>Ae. aegypti</a:t>
+            </a:r>
+            <a:r>
+              <a:rPr lang="en-US" altLang="zh-TW" sz="1200" b="0" i="0" kern="1200" dirty="0">
+                <a:solidFill>
+                  <a:schemeClr val="tx1"/>
+                </a:solidFill>
+                <a:effectLst/>
+                <a:latin typeface="+mn-lt"/>
+                <a:ea typeface="+mn-ea"/>
+                <a:cs typeface="+mn-cs"/>
+              </a:rPr>
+              <a:t> is assigned a color. For the other species, each 100-kb locus is assigned a combination of the colors of the corresponding DNA sequences in </a:t>
+            </a:r>
+            <a:r>
+              <a:rPr lang="en-US" altLang="zh-TW" sz="1200" b="0" i="1" kern="1200" dirty="0">
+                <a:solidFill>
+                  <a:schemeClr val="tx1"/>
+                </a:solidFill>
+                <a:effectLst/>
+                <a:latin typeface="+mn-lt"/>
+                <a:ea typeface="+mn-ea"/>
+                <a:cs typeface="+mn-cs"/>
+              </a:rPr>
+              <a:t>Ae. aegypti</a:t>
+            </a:r>
+            <a:r>
+              <a:rPr lang="en-US" altLang="zh-TW" sz="1200" b="0" i="0" kern="1200" dirty="0">
+                <a:solidFill>
+                  <a:schemeClr val="tx1"/>
+                </a:solidFill>
+                <a:effectLst/>
+                <a:latin typeface="+mn-lt"/>
+                <a:ea typeface="+mn-ea"/>
+                <a:cs typeface="+mn-cs"/>
+              </a:rPr>
+              <a:t>, weighted by length. MYA, million years ago.</a:t>
+            </a:r>
+            <a:endParaRPr kumimoji="1" lang="zh-TW" altLang="en-US" dirty="0"/>
+          </a:p>
+        </p:txBody>
+      </p:sp>
+      <p:sp>
+        <p:nvSpPr>
+          <p:cNvPr id="4" name="投影片編號版面配置區 3"/>
+          <p:cNvSpPr>
+            <a:spLocks noGrp="1"/>
+          </p:cNvSpPr>
+          <p:nvPr>
+            <p:ph type="sldNum" sz="quarter" idx="5"/>
+          </p:nvPr>
+        </p:nvSpPr>
+        <p:spPr/>
+        <p:txBody>
+          <a:bodyPr/>
+          <a:lstStyle/>
+          <a:p>
+            <a:fld id="{13E2295F-EBD7-1947-82C3-64201EC4D8BD}" type="slidenum">
+              <a:rPr kumimoji="1" lang="zh-TW" altLang="en-US" smtClean="0"/>
+              <a:t>25</a:t>
+            </a:fld>
+            <a:endParaRPr kumimoji="1" lang="zh-TW" altLang="en-US"/>
+          </a:p>
+        </p:txBody>
+      </p:sp>
+    </p:spTree>
+    <p:extLst>
+      <p:ext uri="{BB962C8B-B14F-4D97-AF65-F5344CB8AC3E}">
+        <p14:creationId xmlns:p14="http://schemas.microsoft.com/office/powerpoint/2010/main" val="992405365"/>
+      </p:ext>
+    </p:extLst>
+  </p:cSld>
+  <p:clrMapOvr>
+    <a:masterClrMapping/>
+  </p:clrMapOvr>
+</p:notes>
+</file>
+
+<file path=ppt/notesSlides/notesSlide11.xml><?xml version="1.0" encoding="utf-8"?>
+<p:notes xmlns:a="http://schemas.openxmlformats.org/drawingml/2006/main" xmlns:r="http://schemas.openxmlformats.org/officeDocument/2006/relationships" xmlns:p="http://schemas.openxmlformats.org/presentationml/2006/main">
+  <p:cSld>
+    <p:spTree>
+      <p:nvGrpSpPr>
+        <p:cNvPr id="1" name=""/>
+        <p:cNvGrpSpPr/>
+        <p:nvPr/>
+      </p:nvGrpSpPr>
+      <p:grpSpPr>
+        <a:xfrm>
+          <a:off x="0" y="0"/>
+          <a:ext cx="0" cy="0"/>
+          <a:chOff x="0" y="0"/>
+          <a:chExt cx="0" cy="0"/>
+        </a:xfrm>
+      </p:grpSpPr>
+      <p:sp>
+        <p:nvSpPr>
+          <p:cNvPr id="2" name="投影片影像版面配置區 1"/>
+          <p:cNvSpPr>
+            <a:spLocks noGrp="1" noRot="1" noChangeAspect="1"/>
+          </p:cNvSpPr>
+          <p:nvPr>
+            <p:ph type="sldImg"/>
+          </p:nvPr>
+        </p:nvSpPr>
+        <p:spPr/>
+      </p:sp>
+      <p:sp>
+        <p:nvSpPr>
+          <p:cNvPr id="3" name="備忘稿版面配置區 2"/>
+          <p:cNvSpPr>
+            <a:spLocks noGrp="1"/>
+          </p:cNvSpPr>
+          <p:nvPr>
+            <p:ph type="body" idx="1"/>
+          </p:nvPr>
+        </p:nvSpPr>
+        <p:spPr/>
+        <p:txBody>
+          <a:bodyPr/>
+          <a:lstStyle/>
+          <a:p>
+            <a:r>
+              <a:rPr lang="en-US" altLang="zh-TW" dirty="0"/>
+              <a:t>Fig. S19. Conservation of synteny across dipterans. Several chromosome arms, such as D. melanogaster 2L, Ae. aegypti 2q, and </a:t>
+            </a:r>
+            <a:r>
+              <a:rPr lang="en-US" altLang="zh-TW" dirty="0" err="1"/>
+              <a:t>Cx</a:t>
+            </a:r>
+            <a:r>
+              <a:rPr lang="en-US" altLang="zh-TW" dirty="0"/>
+              <a:t>. </a:t>
+            </a:r>
+            <a:r>
+              <a:rPr lang="en-US" altLang="zh-TW" dirty="0" err="1"/>
+              <a:t>quinquefasciatus</a:t>
+            </a:r>
+            <a:r>
+              <a:rPr lang="en-US" altLang="zh-TW" dirty="0"/>
+              <a:t> 2p, show strong conservation of content. </a:t>
+            </a:r>
+            <a:r>
+              <a:rPr lang="en-US" altLang="zh-TW" dirty="0" err="1"/>
+              <a:t>Chromograms</a:t>
+            </a:r>
+            <a:r>
+              <a:rPr lang="en-US" altLang="zh-TW" dirty="0"/>
+              <a:t> along the x- and y- axes indicate which portions of BDGP6 correspond to which positions in the other genomes and genome assemblies.</a:t>
+            </a:r>
+            <a:endParaRPr kumimoji="1" lang="zh-TW" altLang="en-US" dirty="0"/>
+          </a:p>
+        </p:txBody>
+      </p:sp>
+      <p:sp>
+        <p:nvSpPr>
+          <p:cNvPr id="4" name="投影片編號版面配置區 3"/>
+          <p:cNvSpPr>
+            <a:spLocks noGrp="1"/>
+          </p:cNvSpPr>
+          <p:nvPr>
+            <p:ph type="sldNum" sz="quarter" idx="5"/>
+          </p:nvPr>
+        </p:nvSpPr>
+        <p:spPr/>
+        <p:txBody>
+          <a:bodyPr/>
+          <a:lstStyle/>
+          <a:p>
+            <a:fld id="{13E2295F-EBD7-1947-82C3-64201EC4D8BD}" type="slidenum">
+              <a:rPr kumimoji="1" lang="zh-TW" altLang="en-US" smtClean="0"/>
+              <a:t>26</a:t>
+            </a:fld>
+            <a:endParaRPr kumimoji="1" lang="zh-TW" altLang="en-US"/>
+          </a:p>
+        </p:txBody>
+      </p:sp>
+    </p:spTree>
+    <p:extLst>
+      <p:ext uri="{BB962C8B-B14F-4D97-AF65-F5344CB8AC3E}">
+        <p14:creationId xmlns:p14="http://schemas.microsoft.com/office/powerpoint/2010/main" val="1008183591"/>
+      </p:ext>
+    </p:extLst>
+  </p:cSld>
+  <p:clrMapOvr>
+    <a:masterClrMapping/>
+  </p:clrMapOvr>
+</p:notes>
+</file>
+
 <file path=ppt/notesSlides/notesSlide2.xml><?xml version="1.0" encoding="utf-8"?>
 <p:notes xmlns:a="http://schemas.openxmlformats.org/drawingml/2006/main" xmlns:r="http://schemas.openxmlformats.org/officeDocument/2006/relationships" xmlns:p="http://schemas.openxmlformats.org/presentationml/2006/main">
   <p:cSld>
@@ -2442,6 +2706,292 @@
 </p:sldLayout>
 </file>
 
+<file path=ppt/slideLayouts/slideLayout8.xml><?xml version="1.0" encoding="utf-8"?>
+<p:sldLayout xmlns:a="http://schemas.openxmlformats.org/drawingml/2006/main" xmlns:r="http://schemas.openxmlformats.org/officeDocument/2006/relationships" xmlns:p="http://schemas.openxmlformats.org/presentationml/2006/main" type="blank">
+  <p:cSld name="空白">
+    <p:spTree>
+      <p:nvGrpSpPr>
+        <p:cNvPr id="1" name=""/>
+        <p:cNvGrpSpPr/>
+        <p:nvPr/>
+      </p:nvGrpSpPr>
+      <p:grpSpPr>
+        <a:xfrm>
+          <a:off x="0" y="0"/>
+          <a:ext cx="0" cy="0"/>
+          <a:chOff x="0" y="0"/>
+          <a:chExt cx="0" cy="0"/>
+        </a:xfrm>
+      </p:grpSpPr>
+      <p:sp>
+        <p:nvSpPr>
+          <p:cNvPr id="2" name="日期版面配置區 1">
+            <a:extLst>
+              <a:ext uri="{FF2B5EF4-FFF2-40B4-BE49-F238E27FC236}">
+                <a16:creationId xmlns:a16="http://schemas.microsoft.com/office/drawing/2014/main" id="{5950A9C4-30C6-464A-AB65-142A66B2D72A}"/>
+              </a:ext>
+            </a:extLst>
+          </p:cNvPr>
+          <p:cNvSpPr>
+            <a:spLocks noGrp="1"/>
+          </p:cNvSpPr>
+          <p:nvPr>
+            <p:ph type="dt" sz="half" idx="10"/>
+          </p:nvPr>
+        </p:nvSpPr>
+        <p:spPr/>
+        <p:txBody>
+          <a:bodyPr/>
+          <a:lstStyle/>
+          <a:p>
+            <a:fld id="{4B36BC38-6FA5-E146-8A64-5E7AC581D184}" type="datetimeFigureOut">
+              <a:rPr kumimoji="1" lang="zh-TW" altLang="en-US" smtClean="0"/>
+              <a:t>2020/1/7</a:t>
+            </a:fld>
+            <a:endParaRPr kumimoji="1" lang="zh-TW" altLang="en-US"/>
+          </a:p>
+        </p:txBody>
+      </p:sp>
+      <p:sp>
+        <p:nvSpPr>
+          <p:cNvPr id="3" name="頁尾版面配置區 2">
+            <a:extLst>
+              <a:ext uri="{FF2B5EF4-FFF2-40B4-BE49-F238E27FC236}">
+                <a16:creationId xmlns:a16="http://schemas.microsoft.com/office/drawing/2014/main" id="{6BD56062-8414-4B4B-BFED-267720FB65F7}"/>
+              </a:ext>
+            </a:extLst>
+          </p:cNvPr>
+          <p:cNvSpPr>
+            <a:spLocks noGrp="1"/>
+          </p:cNvSpPr>
+          <p:nvPr>
+            <p:ph type="ftr" sz="quarter" idx="11"/>
+          </p:nvPr>
+        </p:nvSpPr>
+        <p:spPr/>
+        <p:txBody>
+          <a:bodyPr/>
+          <a:lstStyle/>
+          <a:p>
+            <a:endParaRPr kumimoji="1" lang="zh-TW" altLang="en-US"/>
+          </a:p>
+        </p:txBody>
+      </p:sp>
+      <p:sp>
+        <p:nvSpPr>
+          <p:cNvPr id="4" name="投影片編號版面配置區 3">
+            <a:extLst>
+              <a:ext uri="{FF2B5EF4-FFF2-40B4-BE49-F238E27FC236}">
+                <a16:creationId xmlns:a16="http://schemas.microsoft.com/office/drawing/2014/main" id="{B9755ACF-EC68-8E48-8D48-A756994DC0CF}"/>
+              </a:ext>
+            </a:extLst>
+          </p:cNvPr>
+          <p:cNvSpPr>
+            <a:spLocks noGrp="1"/>
+          </p:cNvSpPr>
+          <p:nvPr>
+            <p:ph type="sldNum" sz="quarter" idx="12"/>
+          </p:nvPr>
+        </p:nvSpPr>
+        <p:spPr/>
+        <p:txBody>
+          <a:bodyPr/>
+          <a:lstStyle/>
+          <a:p>
+            <a:fld id="{108CFE3F-9ABC-8F49-92E1-728BC11B4F5C}" type="slidenum">
+              <a:rPr kumimoji="1" lang="zh-TW" altLang="en-US" smtClean="0"/>
+              <a:t>‹#›</a:t>
+            </a:fld>
+            <a:endParaRPr kumimoji="1" lang="zh-TW" altLang="en-US"/>
+          </a:p>
+        </p:txBody>
+      </p:sp>
+    </p:spTree>
+    <p:extLst>
+      <p:ext uri="{BB962C8B-B14F-4D97-AF65-F5344CB8AC3E}">
+        <p14:creationId xmlns:p14="http://schemas.microsoft.com/office/powerpoint/2010/main" val="2387165185"/>
+      </p:ext>
+    </p:extLst>
+  </p:cSld>
+  <p:clrMapOvr>
+    <a:masterClrMapping/>
+  </p:clrMapOvr>
+</p:sldLayout>
+</file>
+
+<file path=ppt/slideLayouts/slideLayout9.xml><?xml version="1.0" encoding="utf-8"?>
+<p:sldLayout xmlns:a="http://schemas.openxmlformats.org/drawingml/2006/main" xmlns:r="http://schemas.openxmlformats.org/officeDocument/2006/relationships" xmlns:p="http://schemas.openxmlformats.org/presentationml/2006/main" type="obj">
+  <p:cSld name="標題及內容">
+    <p:spTree>
+      <p:nvGrpSpPr>
+        <p:cNvPr id="1" name=""/>
+        <p:cNvGrpSpPr/>
+        <p:nvPr/>
+      </p:nvGrpSpPr>
+      <p:grpSpPr>
+        <a:xfrm>
+          <a:off x="0" y="0"/>
+          <a:ext cx="0" cy="0"/>
+          <a:chOff x="0" y="0"/>
+          <a:chExt cx="0" cy="0"/>
+        </a:xfrm>
+      </p:grpSpPr>
+      <p:sp>
+        <p:nvSpPr>
+          <p:cNvPr id="2" name="標題 1">
+            <a:extLst>
+              <a:ext uri="{FF2B5EF4-FFF2-40B4-BE49-F238E27FC236}">
+                <a16:creationId xmlns:a16="http://schemas.microsoft.com/office/drawing/2014/main" id="{E1D9D277-7CA7-AC4C-8D2C-03887A7F786B}"/>
+              </a:ext>
+            </a:extLst>
+          </p:cNvPr>
+          <p:cNvSpPr>
+            <a:spLocks noGrp="1"/>
+          </p:cNvSpPr>
+          <p:nvPr>
+            <p:ph type="title"/>
+          </p:nvPr>
+        </p:nvSpPr>
+        <p:spPr/>
+        <p:txBody>
+          <a:bodyPr/>
+          <a:lstStyle/>
+          <a:p>
+            <a:r>
+              <a:rPr kumimoji="1" lang="zh-TW" altLang="en-US"/>
+              <a:t>按一下以編輯母片標題樣式</a:t>
+            </a:r>
+          </a:p>
+        </p:txBody>
+      </p:sp>
+      <p:sp>
+        <p:nvSpPr>
+          <p:cNvPr id="3" name="內容版面配置區 2">
+            <a:extLst>
+              <a:ext uri="{FF2B5EF4-FFF2-40B4-BE49-F238E27FC236}">
+                <a16:creationId xmlns:a16="http://schemas.microsoft.com/office/drawing/2014/main" id="{03C63495-54FE-C14D-9F80-701CE1EE7574}"/>
+              </a:ext>
+            </a:extLst>
+          </p:cNvPr>
+          <p:cNvSpPr>
+            <a:spLocks noGrp="1"/>
+          </p:cNvSpPr>
+          <p:nvPr>
+            <p:ph idx="1"/>
+          </p:nvPr>
+        </p:nvSpPr>
+        <p:spPr/>
+        <p:txBody>
+          <a:bodyPr/>
+          <a:lstStyle/>
+          <a:p>
+            <a:r>
+              <a:rPr kumimoji="1" lang="zh-TW" altLang="en-US"/>
+              <a:t>編輯母片文字樣式
+第二層
+第三層
+第四層
+第五層</a:t>
+            </a:r>
+          </a:p>
+        </p:txBody>
+      </p:sp>
+      <p:sp>
+        <p:nvSpPr>
+          <p:cNvPr id="4" name="日期版面配置區 3">
+            <a:extLst>
+              <a:ext uri="{FF2B5EF4-FFF2-40B4-BE49-F238E27FC236}">
+                <a16:creationId xmlns:a16="http://schemas.microsoft.com/office/drawing/2014/main" id="{E7BE217C-75F1-8244-AB8B-4CC23B89EC40}"/>
+              </a:ext>
+            </a:extLst>
+          </p:cNvPr>
+          <p:cNvSpPr>
+            <a:spLocks noGrp="1"/>
+          </p:cNvSpPr>
+          <p:nvPr>
+            <p:ph type="dt" sz="half" idx="10"/>
+          </p:nvPr>
+        </p:nvSpPr>
+        <p:spPr/>
+        <p:txBody>
+          <a:bodyPr/>
+          <a:lstStyle/>
+          <a:p>
+            <a:fld id="{4B36BC38-6FA5-E146-8A64-5E7AC581D184}" type="datetimeFigureOut">
+              <a:rPr kumimoji="1" lang="zh-TW" altLang="en-US" smtClean="0"/>
+              <a:t>2020/1/7</a:t>
+            </a:fld>
+            <a:endParaRPr kumimoji="1" lang="zh-TW" altLang="en-US"/>
+          </a:p>
+        </p:txBody>
+      </p:sp>
+      <p:sp>
+        <p:nvSpPr>
+          <p:cNvPr id="5" name="頁尾版面配置區 4">
+            <a:extLst>
+              <a:ext uri="{FF2B5EF4-FFF2-40B4-BE49-F238E27FC236}">
+                <a16:creationId xmlns:a16="http://schemas.microsoft.com/office/drawing/2014/main" id="{4C50CD9E-52E7-F841-93E2-C912A3F500FA}"/>
+              </a:ext>
+            </a:extLst>
+          </p:cNvPr>
+          <p:cNvSpPr>
+            <a:spLocks noGrp="1"/>
+          </p:cNvSpPr>
+          <p:nvPr>
+            <p:ph type="ftr" sz="quarter" idx="11"/>
+          </p:nvPr>
+        </p:nvSpPr>
+        <p:spPr/>
+        <p:txBody>
+          <a:bodyPr/>
+          <a:lstStyle/>
+          <a:p>
+            <a:endParaRPr kumimoji="1" lang="zh-TW" altLang="en-US"/>
+          </a:p>
+        </p:txBody>
+      </p:sp>
+      <p:sp>
+        <p:nvSpPr>
+          <p:cNvPr id="6" name="投影片編號版面配置區 5">
+            <a:extLst>
+              <a:ext uri="{FF2B5EF4-FFF2-40B4-BE49-F238E27FC236}">
+                <a16:creationId xmlns:a16="http://schemas.microsoft.com/office/drawing/2014/main" id="{FCC3061F-10B1-3D4B-8C7E-F89AFAA47211}"/>
+              </a:ext>
+            </a:extLst>
+          </p:cNvPr>
+          <p:cNvSpPr>
+            <a:spLocks noGrp="1"/>
+          </p:cNvSpPr>
+          <p:nvPr>
+            <p:ph type="sldNum" sz="quarter" idx="12"/>
+          </p:nvPr>
+        </p:nvSpPr>
+        <p:spPr/>
+        <p:txBody>
+          <a:bodyPr/>
+          <a:lstStyle/>
+          <a:p>
+            <a:fld id="{108CFE3F-9ABC-8F49-92E1-728BC11B4F5C}" type="slidenum">
+              <a:rPr kumimoji="1" lang="zh-TW" altLang="en-US" smtClean="0"/>
+              <a:t>‹#›</a:t>
+            </a:fld>
+            <a:endParaRPr kumimoji="1" lang="zh-TW" altLang="en-US"/>
+          </a:p>
+        </p:txBody>
+      </p:sp>
+    </p:spTree>
+    <p:extLst>
+      <p:ext uri="{BB962C8B-B14F-4D97-AF65-F5344CB8AC3E}">
+        <p14:creationId xmlns:p14="http://schemas.microsoft.com/office/powerpoint/2010/main" val="3598991942"/>
+      </p:ext>
+    </p:extLst>
+  </p:cSld>
+  <p:clrMapOvr>
+    <a:masterClrMapping/>
+  </p:clrMapOvr>
+</p:sldLayout>
+</file>
+
 <file path=ppt/slideMasters/slideMaster1.xml><?xml version="1.0" encoding="utf-8"?>
 <p:sldMaster xmlns:a="http://schemas.openxmlformats.org/drawingml/2006/main" xmlns:r="http://schemas.openxmlformats.org/officeDocument/2006/relationships" xmlns:p="http://schemas.openxmlformats.org/presentationml/2006/main">
   <p:cSld>
@@ -2573,6 +3123,8 @@
     <p:sldLayoutId id="2147483650" r:id="rId5"/>
     <p:sldLayoutId id="2147483672" r:id="rId6"/>
     <p:sldLayoutId id="2147483678" r:id="rId7"/>
+    <p:sldLayoutId id="2147483694" r:id="rId8"/>
+    <p:sldLayoutId id="2147483695" r:id="rId9"/>
   </p:sldLayoutIdLst>
   <p:txStyles>
     <p:titleStyle>
@@ -3413,13 +3965,13 @@
   <p:clrMapOvr>
     <a:masterClrMapping/>
   </p:clrMapOvr>
-  <mc:AlternateContent xmlns:mc="http://schemas.openxmlformats.org/markup-compatibility/2006">
-    <mc:Choice xmlns:p14="http://schemas.microsoft.com/office/powerpoint/2010/main" Requires="p14">
+  <mc:AlternateContent xmlns:mc="http://schemas.openxmlformats.org/markup-compatibility/2006" xmlns:p14="http://schemas.microsoft.com/office/powerpoint/2010/main">
+    <mc:Choice Requires="p14">
       <p:transition spd="med" p14:dur="700">
         <p:fade/>
       </p:transition>
     </mc:Choice>
-    <mc:Fallback>
+    <mc:Fallback xmlns="">
       <p:transition spd="med">
         <p:fade/>
       </p:transition>
@@ -3792,8 +4344,8 @@
             <a:chExt cx="1613783" cy="576761"/>
           </a:xfrm>
         </p:grpSpPr>
-        <mc:AlternateContent xmlns:mc="http://schemas.openxmlformats.org/markup-compatibility/2006">
-          <mc:Choice xmlns:a14="http://schemas.microsoft.com/office/drawing/2010/main" Requires="a14">
+        <mc:AlternateContent xmlns:mc="http://schemas.openxmlformats.org/markup-compatibility/2006" xmlns:a14="http://schemas.microsoft.com/office/drawing/2010/main">
+          <mc:Choice Requires="a14">
             <p:sp>
               <p:nvSpPr>
                 <p:cNvPr id="2" name="文字方塊 1">
@@ -3822,6 +4374,7 @@
                 </a:bodyPr>
                 <a:lstStyle/>
                 <a:p>
+                  <a:pPr/>
                   <a14:m>
                     <m:oMathPara xmlns:m="http://schemas.openxmlformats.org/officeDocument/2006/math">
                       <m:oMathParaPr>
@@ -3861,7 +4414,7 @@
               </p:txBody>
             </p:sp>
           </mc:Choice>
-          <mc:Fallback>
+          <mc:Fallback xmlns="">
             <p:sp>
               <p:nvSpPr>
                 <p:cNvPr id="2" name="文字方塊 1">
@@ -3906,8 +4459,8 @@
             </p:sp>
           </mc:Fallback>
         </mc:AlternateContent>
-        <mc:AlternateContent xmlns:mc="http://schemas.openxmlformats.org/markup-compatibility/2006">
-          <mc:Choice xmlns:a14="http://schemas.microsoft.com/office/drawing/2010/main" Requires="a14">
+        <mc:AlternateContent xmlns:mc="http://schemas.openxmlformats.org/markup-compatibility/2006" xmlns:a14="http://schemas.microsoft.com/office/drawing/2010/main">
+          <mc:Choice Requires="a14">
             <p:sp>
               <p:nvSpPr>
                 <p:cNvPr id="16" name="文字方塊 15">
@@ -3936,6 +4489,7 @@
                 </a:bodyPr>
                 <a:lstStyle/>
                 <a:p>
+                  <a:pPr/>
                   <a14:m>
                     <m:oMathPara xmlns:m="http://schemas.openxmlformats.org/officeDocument/2006/math">
                       <m:oMathParaPr>
@@ -3999,7 +4553,7 @@
               </p:txBody>
             </p:sp>
           </mc:Choice>
-          <mc:Fallback>
+          <mc:Fallback xmlns="">
             <p:sp>
               <p:nvSpPr>
                 <p:cNvPr id="16" name="文字方塊 15">
@@ -4256,13 +4810,13 @@
   <p:clrMapOvr>
     <a:masterClrMapping/>
   </p:clrMapOvr>
-  <mc:AlternateContent xmlns:mc="http://schemas.openxmlformats.org/markup-compatibility/2006">
-    <mc:Choice xmlns:p14="http://schemas.microsoft.com/office/powerpoint/2010/main" Requires="p14">
+  <mc:AlternateContent xmlns:mc="http://schemas.openxmlformats.org/markup-compatibility/2006" xmlns:p14="http://schemas.microsoft.com/office/powerpoint/2010/main">
+    <mc:Choice Requires="p14">
       <p:transition spd="med" p14:dur="700">
         <p:fade/>
       </p:transition>
     </mc:Choice>
-    <mc:Fallback>
+    <mc:Fallback xmlns="">
       <p:transition spd="med">
         <p:fade/>
       </p:transition>
@@ -4385,13 +4939,13 @@
   <p:clrMapOvr>
     <a:masterClrMapping/>
   </p:clrMapOvr>
-  <mc:AlternateContent xmlns:mc="http://schemas.openxmlformats.org/markup-compatibility/2006">
-    <mc:Choice xmlns:p14="http://schemas.microsoft.com/office/powerpoint/2010/main" Requires="p14">
+  <mc:AlternateContent xmlns:mc="http://schemas.openxmlformats.org/markup-compatibility/2006" xmlns:p14="http://schemas.microsoft.com/office/powerpoint/2010/main">
+    <mc:Choice Requires="p14">
       <p:transition spd="med" p14:dur="700">
         <p:fade/>
       </p:transition>
     </mc:Choice>
-    <mc:Fallback>
+    <mc:Fallback xmlns="">
       <p:transition spd="med">
         <p:fade/>
       </p:transition>
@@ -4795,13 +5349,13 @@
   <p:clrMapOvr>
     <a:masterClrMapping/>
   </p:clrMapOvr>
-  <mc:AlternateContent xmlns:mc="http://schemas.openxmlformats.org/markup-compatibility/2006">
-    <mc:Choice xmlns:p14="http://schemas.microsoft.com/office/powerpoint/2010/main" Requires="p14">
+  <mc:AlternateContent xmlns:mc="http://schemas.openxmlformats.org/markup-compatibility/2006" xmlns:p14="http://schemas.microsoft.com/office/powerpoint/2010/main">
+    <mc:Choice Requires="p14">
       <p:transition spd="med" p14:dur="700">
         <p:fade/>
       </p:transition>
     </mc:Choice>
-    <mc:Fallback>
+    <mc:Fallback xmlns="">
       <p:transition spd="med">
         <p:fade/>
       </p:transition>
@@ -5125,13 +5679,13 @@
   <p:clrMapOvr>
     <a:masterClrMapping/>
   </p:clrMapOvr>
-  <mc:AlternateContent xmlns:mc="http://schemas.openxmlformats.org/markup-compatibility/2006">
-    <mc:Choice xmlns:p14="http://schemas.microsoft.com/office/powerpoint/2010/main" Requires="p14">
+  <mc:AlternateContent xmlns:mc="http://schemas.openxmlformats.org/markup-compatibility/2006" xmlns:p14="http://schemas.microsoft.com/office/powerpoint/2010/main">
+    <mc:Choice Requires="p14">
       <p:transition spd="med" p14:dur="700">
         <p:fade/>
       </p:transition>
     </mc:Choice>
-    <mc:Fallback>
+    <mc:Fallback xmlns="">
       <p:transition spd="med">
         <p:fade/>
       </p:transition>
@@ -5388,13 +5942,13 @@
   <p:clrMapOvr>
     <a:masterClrMapping/>
   </p:clrMapOvr>
-  <mc:AlternateContent xmlns:mc="http://schemas.openxmlformats.org/markup-compatibility/2006">
-    <mc:Choice xmlns:p14="http://schemas.microsoft.com/office/powerpoint/2010/main" Requires="p14">
+  <mc:AlternateContent xmlns:mc="http://schemas.openxmlformats.org/markup-compatibility/2006" xmlns:p14="http://schemas.microsoft.com/office/powerpoint/2010/main">
+    <mc:Choice Requires="p14">
       <p:transition spd="med" p14:dur="700">
         <p:fade/>
       </p:transition>
     </mc:Choice>
-    <mc:Fallback>
+    <mc:Fallback xmlns="">
       <p:transition spd="med">
         <p:fade/>
       </p:transition>
@@ -6253,13 +6807,13 @@
   <p:clrMapOvr>
     <a:masterClrMapping/>
   </p:clrMapOvr>
-  <mc:AlternateContent xmlns:mc="http://schemas.openxmlformats.org/markup-compatibility/2006">
-    <mc:Choice xmlns:p14="http://schemas.microsoft.com/office/powerpoint/2010/main" Requires="p14">
+  <mc:AlternateContent xmlns:mc="http://schemas.openxmlformats.org/markup-compatibility/2006" xmlns:p14="http://schemas.microsoft.com/office/powerpoint/2010/main">
+    <mc:Choice Requires="p14">
       <p:transition spd="med" p14:dur="700">
         <p:fade/>
       </p:transition>
     </mc:Choice>
-    <mc:Fallback>
+    <mc:Fallback xmlns="">
       <p:transition spd="med">
         <p:fade/>
       </p:transition>
@@ -6975,13 +7529,13 @@
   <p:clrMapOvr>
     <a:masterClrMapping/>
   </p:clrMapOvr>
-  <mc:AlternateContent xmlns:mc="http://schemas.openxmlformats.org/markup-compatibility/2006">
-    <mc:Choice xmlns:p14="http://schemas.microsoft.com/office/powerpoint/2010/main" Requires="p14">
+  <mc:AlternateContent xmlns:mc="http://schemas.openxmlformats.org/markup-compatibility/2006" xmlns:p14="http://schemas.microsoft.com/office/powerpoint/2010/main">
+    <mc:Choice Requires="p14">
       <p:transition spd="med" p14:dur="700">
         <p:fade/>
       </p:transition>
     </mc:Choice>
-    <mc:Fallback>
+    <mc:Fallback xmlns="">
       <p:transition spd="med">
         <p:fade/>
       </p:transition>
@@ -7599,13 +8153,13 @@
   <p:clrMapOvr>
     <a:masterClrMapping/>
   </p:clrMapOvr>
-  <mc:AlternateContent xmlns:mc="http://schemas.openxmlformats.org/markup-compatibility/2006">
-    <mc:Choice xmlns:p14="http://schemas.microsoft.com/office/powerpoint/2010/main" Requires="p14">
+  <mc:AlternateContent xmlns:mc="http://schemas.openxmlformats.org/markup-compatibility/2006" xmlns:p14="http://schemas.microsoft.com/office/powerpoint/2010/main">
+    <mc:Choice Requires="p14">
       <p:transition spd="med" p14:dur="700">
         <p:fade/>
       </p:transition>
     </mc:Choice>
-    <mc:Fallback>
+    <mc:Fallback xmlns="">
       <p:transition spd="med">
         <p:fade/>
       </p:transition>
@@ -8113,13 +8667,13 @@
   <p:clrMapOvr>
     <a:masterClrMapping/>
   </p:clrMapOvr>
-  <mc:AlternateContent xmlns:mc="http://schemas.openxmlformats.org/markup-compatibility/2006">
-    <mc:Choice xmlns:p14="http://schemas.microsoft.com/office/powerpoint/2010/main" Requires="p14">
+  <mc:AlternateContent xmlns:mc="http://schemas.openxmlformats.org/markup-compatibility/2006" xmlns:p14="http://schemas.microsoft.com/office/powerpoint/2010/main">
+    <mc:Choice Requires="p14">
       <p:transition spd="med" p14:dur="700">
         <p:fade/>
       </p:transition>
     </mc:Choice>
-    <mc:Fallback>
+    <mc:Fallback xmlns="">
       <p:transition spd="med">
         <p:fade/>
       </p:transition>
@@ -8840,13 +9394,13 @@
   <p:clrMapOvr>
     <a:masterClrMapping/>
   </p:clrMapOvr>
-  <mc:AlternateContent xmlns:mc="http://schemas.openxmlformats.org/markup-compatibility/2006">
-    <mc:Choice xmlns:p14="http://schemas.microsoft.com/office/powerpoint/2010/main" Requires="p14">
+  <mc:AlternateContent xmlns:mc="http://schemas.openxmlformats.org/markup-compatibility/2006" xmlns:p14="http://schemas.microsoft.com/office/powerpoint/2010/main">
+    <mc:Choice Requires="p14">
       <p:transition spd="med" p14:dur="700">
         <p:fade/>
       </p:transition>
     </mc:Choice>
-    <mc:Fallback>
+    <mc:Fallback xmlns="">
       <p:transition spd="med">
         <p:fade/>
       </p:transition>
@@ -8969,13 +9523,13 @@
   <p:clrMapOvr>
     <a:masterClrMapping/>
   </p:clrMapOvr>
-  <mc:AlternateContent xmlns:mc="http://schemas.openxmlformats.org/markup-compatibility/2006">
-    <mc:Choice xmlns:p14="http://schemas.microsoft.com/office/powerpoint/2010/main" Requires="p14">
+  <mc:AlternateContent xmlns:mc="http://schemas.openxmlformats.org/markup-compatibility/2006" xmlns:p14="http://schemas.microsoft.com/office/powerpoint/2010/main">
+    <mc:Choice Requires="p14">
       <p:transition spd="med" p14:dur="700">
         <p:fade/>
       </p:transition>
     </mc:Choice>
-    <mc:Fallback>
+    <mc:Fallback xmlns="">
       <p:transition spd="med">
         <p:fade/>
       </p:transition>
@@ -9072,6 +9626,1739 @@
           </a:lstStyle>
           <a:p>
             <a:r>
+              <a:rPr lang="en-US" altLang="zh-TW" sz="4400" b="1" spc="300" dirty="0">
+                <a:solidFill>
+                  <a:schemeClr val="tx1">
+                    <a:lumMod val="95000"/>
+                    <a:lumOff val="5000"/>
+                  </a:schemeClr>
+                </a:solidFill>
+                <a:latin typeface="Yu Gothic UI Light" panose="020B0300000000000000" pitchFamily="34" charset="-128"/>
+                <a:ea typeface="Yu Gothic UI Light" panose="020B0300000000000000" pitchFamily="34" charset="-128"/>
+                <a:cs typeface="+mn-cs"/>
+              </a:rPr>
+              <a:t>Supp</a:t>
+            </a:r>
+            <a:br>
+              <a:rPr lang="en-US" altLang="zh-TW" sz="4400" b="1" spc="300" dirty="0">
+                <a:solidFill>
+                  <a:schemeClr val="tx1">
+                    <a:lumMod val="95000"/>
+                    <a:lumOff val="5000"/>
+                  </a:schemeClr>
+                </a:solidFill>
+                <a:latin typeface="Yu Gothic UI Light" panose="020B0300000000000000" pitchFamily="34" charset="-128"/>
+                <a:ea typeface="Yu Gothic UI Light" panose="020B0300000000000000" pitchFamily="34" charset="-128"/>
+                <a:cs typeface="+mn-cs"/>
+              </a:rPr>
+            </a:br>
+            <a:endParaRPr lang="en-US" sz="4400" b="1" spc="300" dirty="0">
+              <a:solidFill>
+                <a:schemeClr val="tx1">
+                  <a:lumMod val="95000"/>
+                  <a:lumOff val="5000"/>
+                </a:schemeClr>
+              </a:solidFill>
+              <a:latin typeface="Yu Gothic UI Light" panose="020B0300000000000000" pitchFamily="34" charset="-128"/>
+              <a:ea typeface="Yu Gothic UI Light" panose="020B0300000000000000" pitchFamily="34" charset="-128"/>
+              <a:cs typeface="+mn-cs"/>
+            </a:endParaRPr>
+          </a:p>
+        </p:txBody>
+      </p:sp>
+      <p:sp>
+        <p:nvSpPr>
+          <p:cNvPr id="2" name="文字方塊 1">
+            <a:extLst>
+              <a:ext uri="{FF2B5EF4-FFF2-40B4-BE49-F238E27FC236}">
+                <a16:creationId xmlns:a16="http://schemas.microsoft.com/office/drawing/2014/main" id="{B0D592BF-13F8-49C0-A366-A7BCDDB4258E}"/>
+              </a:ext>
+            </a:extLst>
+          </p:cNvPr>
+          <p:cNvSpPr txBox="1"/>
+          <p:nvPr/>
+        </p:nvSpPr>
+        <p:spPr>
+          <a:xfrm>
+            <a:off x="2182483" y="2705745"/>
+            <a:ext cx="7772400" cy="3354765"/>
+          </a:xfrm>
+          <a:prstGeom prst="rect">
+            <a:avLst/>
+          </a:prstGeom>
+          <a:noFill/>
+        </p:spPr>
+        <p:txBody>
+          <a:bodyPr wrap="square" rtlCol="0">
+            <a:spAutoFit/>
+          </a:bodyPr>
+          <a:lstStyle/>
+          <a:p>
+            <a:pPr marL="342900" indent="-342900">
+              <a:buFont typeface="+mj-lt"/>
+              <a:buAutoNum type="arabicPeriod"/>
+            </a:pPr>
+            <a:r>
+              <a:rPr lang="en-US" altLang="zh-TW" sz="1600" dirty="0">
+                <a:latin typeface="Yu Gothic UI Light" panose="020B0300000000000000" pitchFamily="34" charset="-128"/>
+                <a:ea typeface="Yu Gothic UI Light" panose="020B0300000000000000" pitchFamily="34" charset="-128"/>
+              </a:rPr>
+              <a:t>With the Zika virus spreading largely unchecked in Latin America and the Caribbean by way of a now-notorious insect, some of the nation’s leading mosquito researchers are striving to assemble a state-of-the-art DNA map that they say will help them fight the disease with the mosquito’s own genetic code.</a:t>
+            </a:r>
+          </a:p>
+          <a:p>
+            <a:pPr marL="342900" indent="-342900">
+              <a:buFont typeface="+mj-lt"/>
+              <a:buAutoNum type="arabicPeriod"/>
+            </a:pPr>
+            <a:endParaRPr lang="en-US" altLang="zh-TW" sz="1600" dirty="0">
+              <a:latin typeface="Yu Gothic UI Light" panose="020B0300000000000000" pitchFamily="34" charset="-128"/>
+              <a:ea typeface="Yu Gothic UI Light" panose="020B0300000000000000" pitchFamily="34" charset="-128"/>
+            </a:endParaRPr>
+          </a:p>
+          <a:p>
+            <a:pPr marL="342900" indent="-342900">
+              <a:buFont typeface="+mj-lt"/>
+              <a:buAutoNum type="arabicPeriod"/>
+            </a:pPr>
+            <a:r>
+              <a:rPr lang="en-US" altLang="zh-TW" sz="1600" dirty="0">
+                <a:latin typeface="Yu Gothic UI Light" panose="020B0300000000000000" pitchFamily="34" charset="-128"/>
+                <a:ea typeface="Yu Gothic UI Light" panose="020B0300000000000000" pitchFamily="34" charset="-128"/>
+              </a:rPr>
+              <a:t>Some want to hunt for genes that, if altered in mosquitoes released into the wild, could drive the species to extinction. Others are trying to identify genes that control how mosquitoes sense human prey so as to devise better repellents. Still others favor the idea of selectively breeding populations of mosquitoes, like corn or cattle, for desirable — or, at least, less undesirable — traits, such as a preference for biting animals other than humans.</a:t>
+            </a:r>
+          </a:p>
+          <a:p>
+            <a:pPr marL="342900" indent="-342900">
+              <a:buFont typeface="+mj-lt"/>
+              <a:buAutoNum type="arabicPeriod"/>
+            </a:pPr>
+            <a:endParaRPr lang="en-US" altLang="zh-TW" b="1" dirty="0">
+              <a:latin typeface="Yu Gothic UI Light" panose="020B0300000000000000" pitchFamily="34" charset="-128"/>
+              <a:ea typeface="Yu Gothic UI Light" panose="020B0300000000000000" pitchFamily="34" charset="-128"/>
+            </a:endParaRPr>
+          </a:p>
+          <a:p>
+            <a:pPr marL="342900" indent="-342900">
+              <a:buFont typeface="+mj-lt"/>
+              <a:buAutoNum type="arabicPeriod"/>
+            </a:pPr>
+            <a:endParaRPr lang="zh-TW" altLang="en-US" b="1" dirty="0">
+              <a:latin typeface="Yu Gothic UI Light" panose="020B0300000000000000" pitchFamily="34" charset="-128"/>
+              <a:ea typeface="Yu Gothic UI Light" panose="020B0300000000000000" pitchFamily="34" charset="-128"/>
+            </a:endParaRPr>
+          </a:p>
+        </p:txBody>
+      </p:sp>
+    </p:spTree>
+    <p:extLst>
+      <p:ext uri="{BB962C8B-B14F-4D97-AF65-F5344CB8AC3E}">
+        <p14:creationId xmlns:p14="http://schemas.microsoft.com/office/powerpoint/2010/main" val="3030163978"/>
+      </p:ext>
+    </p:extLst>
+  </p:cSld>
+  <p:clrMapOvr>
+    <a:masterClrMapping/>
+  </p:clrMapOvr>
+  <mc:AlternateContent xmlns:mc="http://schemas.openxmlformats.org/markup-compatibility/2006" xmlns:p14="http://schemas.microsoft.com/office/powerpoint/2010/main">
+    <mc:Choice Requires="p14">
+      <p:transition spd="med" p14:dur="700">
+        <p:fade/>
+      </p:transition>
+    </mc:Choice>
+    <mc:Fallback xmlns="">
+      <p:transition spd="med">
+        <p:fade/>
+      </p:transition>
+    </mc:Fallback>
+  </mc:AlternateContent>
+</p:sld>
+</file>
+
+<file path=ppt/slides/slide21.xml><?xml version="1.0" encoding="utf-8"?>
+<p:sld xmlns:a="http://schemas.openxmlformats.org/drawingml/2006/main" xmlns:r="http://schemas.openxmlformats.org/officeDocument/2006/relationships" xmlns:p="http://schemas.openxmlformats.org/presentationml/2006/main">
+  <p:cSld>
+    <p:spTree>
+      <p:nvGrpSpPr>
+        <p:cNvPr id="1" name=""/>
+        <p:cNvGrpSpPr/>
+        <p:nvPr/>
+      </p:nvGrpSpPr>
+      <p:grpSpPr>
+        <a:xfrm>
+          <a:off x="0" y="0"/>
+          <a:ext cx="0" cy="0"/>
+          <a:chOff x="0" y="0"/>
+          <a:chExt cx="0" cy="0"/>
+        </a:xfrm>
+      </p:grpSpPr>
+      <p:sp>
+        <p:nvSpPr>
+          <p:cNvPr id="3" name="Text Placeholder 2"/>
+          <p:cNvSpPr>
+            <a:spLocks noGrp="1"/>
+          </p:cNvSpPr>
+          <p:nvPr>
+            <p:ph type="body" sz="quarter" idx="10"/>
+          </p:nvPr>
+        </p:nvSpPr>
+        <p:spPr/>
+        <p:txBody>
+          <a:bodyPr/>
+          <a:lstStyle/>
+          <a:p>
+            <a:r>
+              <a:rPr lang="zh-TW" altLang="en-US" dirty="0"/>
+              <a:t>實驗結果整理</a:t>
+            </a:r>
+            <a:endParaRPr lang="en-US" altLang="zh-TW" dirty="0"/>
+          </a:p>
+        </p:txBody>
+      </p:sp>
+      <p:sp>
+        <p:nvSpPr>
+          <p:cNvPr id="20" name="Title 1">
+            <a:extLst>
+              <a:ext uri="{FF2B5EF4-FFF2-40B4-BE49-F238E27FC236}">
+                <a16:creationId xmlns:a16="http://schemas.microsoft.com/office/drawing/2014/main" id="{89183AB5-A3B1-49E3-BFF5-DCB6C3D7B5B5}"/>
+              </a:ext>
+            </a:extLst>
+          </p:cNvPr>
+          <p:cNvSpPr txBox="1">
+            <a:spLocks/>
+          </p:cNvSpPr>
+          <p:nvPr/>
+        </p:nvSpPr>
+        <p:spPr>
+          <a:xfrm>
+            <a:off x="2120860" y="1349388"/>
+            <a:ext cx="4127541" cy="1140696"/>
+          </a:xfrm>
+          <a:prstGeom prst="rect">
+            <a:avLst/>
+          </a:prstGeom>
+        </p:spPr>
+        <p:txBody>
+          <a:bodyPr vert="horz" lIns="0" tIns="45720" rIns="0" bIns="45720" rtlCol="0" anchor="t">
+            <a:noAutofit/>
+          </a:bodyPr>
+          <a:lstStyle>
+            <a:lvl1pPr algn="l" defTabSz="914377" rtl="0" eaLnBrk="1" latinLnBrk="0" hangingPunct="1">
+              <a:lnSpc>
+                <a:spcPct val="90000"/>
+              </a:lnSpc>
+              <a:spcBef>
+                <a:spcPct val="0"/>
+              </a:spcBef>
+              <a:buNone/>
+              <a:defRPr sz="3200" b="0" i="0" kern="1200" spc="600">
+                <a:solidFill>
+                  <a:schemeClr val="tx1"/>
+                </a:solidFill>
+                <a:latin typeface="Cinzel" charset="0"/>
+                <a:ea typeface="Cinzel" charset="0"/>
+                <a:cs typeface="Cinzel" charset="0"/>
+              </a:defRPr>
+            </a:lvl1pPr>
+          </a:lstStyle>
+          <a:p>
+            <a:r>
+              <a:rPr lang="en-US" altLang="zh-TW" sz="4400" b="1" spc="300" dirty="0">
+                <a:solidFill>
+                  <a:schemeClr val="tx1">
+                    <a:lumMod val="95000"/>
+                    <a:lumOff val="5000"/>
+                  </a:schemeClr>
+                </a:solidFill>
+                <a:latin typeface="Yu Gothic UI Light" panose="020B0300000000000000" pitchFamily="34" charset="-128"/>
+                <a:ea typeface="Yu Gothic UI Light" panose="020B0300000000000000" pitchFamily="34" charset="-128"/>
+                <a:cs typeface="+mn-cs"/>
+              </a:rPr>
+              <a:t>Supp</a:t>
+            </a:r>
+            <a:br>
+              <a:rPr lang="en-US" altLang="zh-TW" sz="4400" b="1" spc="300" dirty="0">
+                <a:solidFill>
+                  <a:schemeClr val="tx1">
+                    <a:lumMod val="95000"/>
+                    <a:lumOff val="5000"/>
+                  </a:schemeClr>
+                </a:solidFill>
+                <a:latin typeface="Yu Gothic UI Light" panose="020B0300000000000000" pitchFamily="34" charset="-128"/>
+                <a:ea typeface="Yu Gothic UI Light" panose="020B0300000000000000" pitchFamily="34" charset="-128"/>
+                <a:cs typeface="+mn-cs"/>
+              </a:rPr>
+            </a:br>
+            <a:endParaRPr lang="en-US" sz="4400" b="1" spc="300" dirty="0">
+              <a:solidFill>
+                <a:schemeClr val="tx1">
+                  <a:lumMod val="95000"/>
+                  <a:lumOff val="5000"/>
+                </a:schemeClr>
+              </a:solidFill>
+              <a:latin typeface="Yu Gothic UI Light" panose="020B0300000000000000" pitchFamily="34" charset="-128"/>
+              <a:ea typeface="Yu Gothic UI Light" panose="020B0300000000000000" pitchFamily="34" charset="-128"/>
+              <a:cs typeface="+mn-cs"/>
+            </a:endParaRPr>
+          </a:p>
+        </p:txBody>
+      </p:sp>
+      <p:sp>
+        <p:nvSpPr>
+          <p:cNvPr id="2" name="文字方塊 1">
+            <a:extLst>
+              <a:ext uri="{FF2B5EF4-FFF2-40B4-BE49-F238E27FC236}">
+                <a16:creationId xmlns:a16="http://schemas.microsoft.com/office/drawing/2014/main" id="{B0D592BF-13F8-49C0-A366-A7BCDDB4258E}"/>
+              </a:ext>
+            </a:extLst>
+          </p:cNvPr>
+          <p:cNvSpPr txBox="1"/>
+          <p:nvPr/>
+        </p:nvSpPr>
+        <p:spPr>
+          <a:xfrm>
+            <a:off x="4278198" y="2894280"/>
+            <a:ext cx="7772400" cy="2862322"/>
+          </a:xfrm>
+          <a:prstGeom prst="rect">
+            <a:avLst/>
+          </a:prstGeom>
+          <a:noFill/>
+        </p:spPr>
+        <p:txBody>
+          <a:bodyPr wrap="square" rtlCol="0">
+            <a:spAutoFit/>
+          </a:bodyPr>
+          <a:lstStyle/>
+          <a:p>
+            <a:pPr marL="342900" indent="-342900">
+              <a:buFont typeface="+mj-lt"/>
+              <a:buAutoNum type="arabicPeriod"/>
+            </a:pPr>
+            <a:r>
+              <a:rPr lang="en-US" altLang="zh-TW" sz="1600" dirty="0">
+                <a:latin typeface="Yu Gothic UI Light" panose="020B0300000000000000" pitchFamily="34" charset="-128"/>
+                <a:ea typeface="Yu Gothic UI Light" panose="020B0300000000000000" pitchFamily="34" charset="-128"/>
+              </a:rPr>
+              <a:t>That a genome map for Aedes aegypti, however imperfect, was published in 2007 is a testament to the species’ longtime status as a potent human foe. (Its genus name, bestowed by 18th-century naturalists with a penchant for accuracy, means “unpleasant” in ancient Greek; “aegypti” refers to Egypt, where it was first believed to have been collected.)</a:t>
+            </a:r>
+          </a:p>
+          <a:p>
+            <a:pPr marL="342900" indent="-342900">
+              <a:buFont typeface="+mj-lt"/>
+              <a:buAutoNum type="arabicPeriod"/>
+            </a:pPr>
+            <a:endParaRPr lang="en-US" altLang="zh-TW" sz="1600" dirty="0">
+              <a:latin typeface="Yu Gothic UI Light" panose="020B0300000000000000" pitchFamily="34" charset="-128"/>
+              <a:ea typeface="Yu Gothic UI Light" panose="020B0300000000000000" pitchFamily="34" charset="-128"/>
+            </a:endParaRPr>
+          </a:p>
+          <a:p>
+            <a:pPr marL="342900" indent="-342900">
+              <a:buFont typeface="+mj-lt"/>
+              <a:buAutoNum type="arabicPeriod"/>
+            </a:pPr>
+            <a:r>
+              <a:rPr lang="en-US" altLang="zh-TW" sz="1600" dirty="0">
+                <a:latin typeface="Yu Gothic UI Light" panose="020B0300000000000000" pitchFamily="34" charset="-128"/>
+                <a:ea typeface="Yu Gothic UI Light" panose="020B0300000000000000" pitchFamily="34" charset="-128"/>
+              </a:rPr>
+              <a:t>Besides Zika and yellow fever, the insect carries dengue, which causes a severe and sometimes fatal flulike illness, and chikungunya, which can cause intense joint pain that lasts for years.</a:t>
+            </a:r>
+          </a:p>
+          <a:p>
+            <a:pPr marL="342900" indent="-342900">
+              <a:buFont typeface="+mj-lt"/>
+              <a:buAutoNum type="arabicPeriod"/>
+            </a:pPr>
+            <a:endParaRPr lang="en-US" altLang="zh-TW" b="1" dirty="0">
+              <a:latin typeface="Yu Gothic UI Light" panose="020B0300000000000000" pitchFamily="34" charset="-128"/>
+              <a:ea typeface="Yu Gothic UI Light" panose="020B0300000000000000" pitchFamily="34" charset="-128"/>
+            </a:endParaRPr>
+          </a:p>
+          <a:p>
+            <a:pPr marL="342900" indent="-342900">
+              <a:buFont typeface="+mj-lt"/>
+              <a:buAutoNum type="arabicPeriod"/>
+            </a:pPr>
+            <a:endParaRPr lang="zh-TW" altLang="en-US" b="1" dirty="0">
+              <a:latin typeface="Yu Gothic UI Light" panose="020B0300000000000000" pitchFamily="34" charset="-128"/>
+              <a:ea typeface="Yu Gothic UI Light" panose="020B0300000000000000" pitchFamily="34" charset="-128"/>
+            </a:endParaRPr>
+          </a:p>
+        </p:txBody>
+      </p:sp>
+      <p:pic>
+        <p:nvPicPr>
+          <p:cNvPr id="5" name="Google Shape;62;p14">
+            <a:extLst>
+              <a:ext uri="{FF2B5EF4-FFF2-40B4-BE49-F238E27FC236}">
+                <a16:creationId xmlns:a16="http://schemas.microsoft.com/office/drawing/2014/main" id="{5222BDA7-0B16-4030-BB95-B7B11FEE6A26}"/>
+              </a:ext>
+            </a:extLst>
+          </p:cNvPr>
+          <p:cNvPicPr preferRelativeResize="0"/>
+          <p:nvPr/>
+        </p:nvPicPr>
+        <p:blipFill>
+          <a:blip r:embed="rId2">
+            <a:alphaModFix/>
+          </a:blip>
+          <a:stretch>
+            <a:fillRect/>
+          </a:stretch>
+        </p:blipFill>
+        <p:spPr>
+          <a:xfrm>
+            <a:off x="792136" y="2594033"/>
+            <a:ext cx="3363514" cy="3778487"/>
+          </a:xfrm>
+          <a:prstGeom prst="rect">
+            <a:avLst/>
+          </a:prstGeom>
+          <a:noFill/>
+          <a:ln>
+            <a:noFill/>
+          </a:ln>
+        </p:spPr>
+      </p:pic>
+    </p:spTree>
+    <p:extLst>
+      <p:ext uri="{BB962C8B-B14F-4D97-AF65-F5344CB8AC3E}">
+        <p14:creationId xmlns:p14="http://schemas.microsoft.com/office/powerpoint/2010/main" val="3683271322"/>
+      </p:ext>
+    </p:extLst>
+  </p:cSld>
+  <p:clrMapOvr>
+    <a:masterClrMapping/>
+  </p:clrMapOvr>
+  <mc:AlternateContent xmlns:mc="http://schemas.openxmlformats.org/markup-compatibility/2006" xmlns:p14="http://schemas.microsoft.com/office/powerpoint/2010/main">
+    <mc:Choice Requires="p14">
+      <p:transition spd="med" p14:dur="700">
+        <p:fade/>
+      </p:transition>
+    </mc:Choice>
+    <mc:Fallback xmlns="">
+      <p:transition spd="med">
+        <p:fade/>
+      </p:transition>
+    </mc:Fallback>
+  </mc:AlternateContent>
+</p:sld>
+</file>
+
+<file path=ppt/slides/slide22.xml><?xml version="1.0" encoding="utf-8"?>
+<p:sld xmlns:a="http://schemas.openxmlformats.org/drawingml/2006/main" xmlns:r="http://schemas.openxmlformats.org/officeDocument/2006/relationships" xmlns:p="http://schemas.openxmlformats.org/presentationml/2006/main">
+  <p:cSld>
+    <p:spTree>
+      <p:nvGrpSpPr>
+        <p:cNvPr id="1" name=""/>
+        <p:cNvGrpSpPr/>
+        <p:nvPr/>
+      </p:nvGrpSpPr>
+      <p:grpSpPr>
+        <a:xfrm>
+          <a:off x="0" y="0"/>
+          <a:ext cx="0" cy="0"/>
+          <a:chOff x="0" y="0"/>
+          <a:chExt cx="0" cy="0"/>
+        </a:xfrm>
+      </p:grpSpPr>
+      <p:sp>
+        <p:nvSpPr>
+          <p:cNvPr id="3" name="Text Placeholder 2"/>
+          <p:cNvSpPr>
+            <a:spLocks noGrp="1"/>
+          </p:cNvSpPr>
+          <p:nvPr>
+            <p:ph type="body" sz="quarter" idx="10"/>
+          </p:nvPr>
+        </p:nvSpPr>
+        <p:spPr/>
+        <p:txBody>
+          <a:bodyPr/>
+          <a:lstStyle/>
+          <a:p>
+            <a:r>
+              <a:rPr lang="zh-TW" altLang="en-US" dirty="0"/>
+              <a:t>實驗結果整理</a:t>
+            </a:r>
+            <a:endParaRPr lang="en-US" altLang="zh-TW" dirty="0"/>
+          </a:p>
+        </p:txBody>
+      </p:sp>
+      <p:sp>
+        <p:nvSpPr>
+          <p:cNvPr id="20" name="Title 1">
+            <a:extLst>
+              <a:ext uri="{FF2B5EF4-FFF2-40B4-BE49-F238E27FC236}">
+                <a16:creationId xmlns:a16="http://schemas.microsoft.com/office/drawing/2014/main" id="{89183AB5-A3B1-49E3-BFF5-DCB6C3D7B5B5}"/>
+              </a:ext>
+            </a:extLst>
+          </p:cNvPr>
+          <p:cNvSpPr txBox="1">
+            <a:spLocks/>
+          </p:cNvSpPr>
+          <p:nvPr/>
+        </p:nvSpPr>
+        <p:spPr>
+          <a:xfrm>
+            <a:off x="2120860" y="1349388"/>
+            <a:ext cx="4127541" cy="1140696"/>
+          </a:xfrm>
+          <a:prstGeom prst="rect">
+            <a:avLst/>
+          </a:prstGeom>
+        </p:spPr>
+        <p:txBody>
+          <a:bodyPr vert="horz" lIns="0" tIns="45720" rIns="0" bIns="45720" rtlCol="0" anchor="t">
+            <a:noAutofit/>
+          </a:bodyPr>
+          <a:lstStyle>
+            <a:lvl1pPr algn="l" defTabSz="914377" rtl="0" eaLnBrk="1" latinLnBrk="0" hangingPunct="1">
+              <a:lnSpc>
+                <a:spcPct val="90000"/>
+              </a:lnSpc>
+              <a:spcBef>
+                <a:spcPct val="0"/>
+              </a:spcBef>
+              <a:buNone/>
+              <a:defRPr sz="3200" b="0" i="0" kern="1200" spc="600">
+                <a:solidFill>
+                  <a:schemeClr val="tx1"/>
+                </a:solidFill>
+                <a:latin typeface="Cinzel" charset="0"/>
+                <a:ea typeface="Cinzel" charset="0"/>
+                <a:cs typeface="Cinzel" charset="0"/>
+              </a:defRPr>
+            </a:lvl1pPr>
+          </a:lstStyle>
+          <a:p>
+            <a:r>
+              <a:rPr lang="en-US" altLang="zh-TW" sz="4400" b="1" spc="300" dirty="0">
+                <a:solidFill>
+                  <a:schemeClr val="tx1">
+                    <a:lumMod val="95000"/>
+                    <a:lumOff val="5000"/>
+                  </a:schemeClr>
+                </a:solidFill>
+                <a:latin typeface="Yu Gothic UI Light" panose="020B0300000000000000" pitchFamily="34" charset="-128"/>
+                <a:ea typeface="Yu Gothic UI Light" panose="020B0300000000000000" pitchFamily="34" charset="-128"/>
+                <a:cs typeface="+mn-cs"/>
+              </a:rPr>
+              <a:t>Supp</a:t>
+            </a:r>
+            <a:br>
+              <a:rPr lang="en-US" altLang="zh-TW" sz="4400" b="1" spc="300" dirty="0">
+                <a:solidFill>
+                  <a:schemeClr val="tx1">
+                    <a:lumMod val="95000"/>
+                    <a:lumOff val="5000"/>
+                  </a:schemeClr>
+                </a:solidFill>
+                <a:latin typeface="Yu Gothic UI Light" panose="020B0300000000000000" pitchFamily="34" charset="-128"/>
+                <a:ea typeface="Yu Gothic UI Light" panose="020B0300000000000000" pitchFamily="34" charset="-128"/>
+                <a:cs typeface="+mn-cs"/>
+              </a:rPr>
+            </a:br>
+            <a:endParaRPr lang="en-US" sz="4400" b="1" spc="300" dirty="0">
+              <a:solidFill>
+                <a:schemeClr val="tx1">
+                  <a:lumMod val="95000"/>
+                  <a:lumOff val="5000"/>
+                </a:schemeClr>
+              </a:solidFill>
+              <a:latin typeface="Yu Gothic UI Light" panose="020B0300000000000000" pitchFamily="34" charset="-128"/>
+              <a:ea typeface="Yu Gothic UI Light" panose="020B0300000000000000" pitchFamily="34" charset="-128"/>
+              <a:cs typeface="+mn-cs"/>
+            </a:endParaRPr>
+          </a:p>
+        </p:txBody>
+      </p:sp>
+      <p:sp>
+        <p:nvSpPr>
+          <p:cNvPr id="2" name="文字方塊 1">
+            <a:extLst>
+              <a:ext uri="{FF2B5EF4-FFF2-40B4-BE49-F238E27FC236}">
+                <a16:creationId xmlns:a16="http://schemas.microsoft.com/office/drawing/2014/main" id="{B0D592BF-13F8-49C0-A366-A7BCDDB4258E}"/>
+              </a:ext>
+            </a:extLst>
+          </p:cNvPr>
+          <p:cNvSpPr txBox="1"/>
+          <p:nvPr/>
+        </p:nvSpPr>
+        <p:spPr>
+          <a:xfrm>
+            <a:off x="4278198" y="2894280"/>
+            <a:ext cx="7772400" cy="2123658"/>
+          </a:xfrm>
+          <a:prstGeom prst="rect">
+            <a:avLst/>
+          </a:prstGeom>
+          <a:noFill/>
+        </p:spPr>
+        <p:txBody>
+          <a:bodyPr wrap="square" rtlCol="0">
+            <a:spAutoFit/>
+          </a:bodyPr>
+          <a:lstStyle/>
+          <a:p>
+            <a:pPr marL="342900" indent="-342900">
+              <a:buFont typeface="+mj-lt"/>
+              <a:buAutoNum type="arabicPeriod"/>
+            </a:pPr>
+            <a:r>
+              <a:rPr lang="en-US" altLang="zh-TW" sz="1600" dirty="0">
+                <a:latin typeface="Yu Gothic UI Light" panose="020B0300000000000000" pitchFamily="34" charset="-128"/>
+                <a:ea typeface="Yu Gothic UI Light" panose="020B0300000000000000" pitchFamily="34" charset="-128"/>
+              </a:rPr>
+              <a:t>But the technology used for the 2007 Aedes map, and many others, could only read relatively short stretches of DNA at a time, which were then pieced together by matching up the sections where they overlapped in a process that often left some areas garbled and riddled with gaps. And since more than half of the Aedes genome consists of sequences that repeat again and again, it has proved more difficult than many genomes to make sense of.</a:t>
+            </a:r>
+          </a:p>
+          <a:p>
+            <a:endParaRPr lang="en-US" altLang="zh-TW" b="1" dirty="0">
+              <a:latin typeface="Yu Gothic UI Light" panose="020B0300000000000000" pitchFamily="34" charset="-128"/>
+              <a:ea typeface="Yu Gothic UI Light" panose="020B0300000000000000" pitchFamily="34" charset="-128"/>
+            </a:endParaRPr>
+          </a:p>
+          <a:p>
+            <a:pPr marL="342900" indent="-342900">
+              <a:buFont typeface="+mj-lt"/>
+              <a:buAutoNum type="arabicPeriod"/>
+            </a:pPr>
+            <a:endParaRPr lang="zh-TW" altLang="en-US" b="1" dirty="0">
+              <a:latin typeface="Yu Gothic UI Light" panose="020B0300000000000000" pitchFamily="34" charset="-128"/>
+              <a:ea typeface="Yu Gothic UI Light" panose="020B0300000000000000" pitchFamily="34" charset="-128"/>
+            </a:endParaRPr>
+          </a:p>
+        </p:txBody>
+      </p:sp>
+      <p:pic>
+        <p:nvPicPr>
+          <p:cNvPr id="5" name="Google Shape;62;p14">
+            <a:extLst>
+              <a:ext uri="{FF2B5EF4-FFF2-40B4-BE49-F238E27FC236}">
+                <a16:creationId xmlns:a16="http://schemas.microsoft.com/office/drawing/2014/main" id="{5222BDA7-0B16-4030-BB95-B7B11FEE6A26}"/>
+              </a:ext>
+            </a:extLst>
+          </p:cNvPr>
+          <p:cNvPicPr preferRelativeResize="0"/>
+          <p:nvPr/>
+        </p:nvPicPr>
+        <p:blipFill>
+          <a:blip r:embed="rId2">
+            <a:alphaModFix/>
+          </a:blip>
+          <a:stretch>
+            <a:fillRect/>
+          </a:stretch>
+        </p:blipFill>
+        <p:spPr>
+          <a:xfrm>
+            <a:off x="792136" y="2594033"/>
+            <a:ext cx="3363514" cy="3778487"/>
+          </a:xfrm>
+          <a:prstGeom prst="rect">
+            <a:avLst/>
+          </a:prstGeom>
+          <a:noFill/>
+          <a:ln>
+            <a:noFill/>
+          </a:ln>
+        </p:spPr>
+      </p:pic>
+    </p:spTree>
+    <p:extLst>
+      <p:ext uri="{BB962C8B-B14F-4D97-AF65-F5344CB8AC3E}">
+        <p14:creationId xmlns:p14="http://schemas.microsoft.com/office/powerpoint/2010/main" val="3470166671"/>
+      </p:ext>
+    </p:extLst>
+  </p:cSld>
+  <p:clrMapOvr>
+    <a:masterClrMapping/>
+  </p:clrMapOvr>
+  <mc:AlternateContent xmlns:mc="http://schemas.openxmlformats.org/markup-compatibility/2006" xmlns:p14="http://schemas.microsoft.com/office/powerpoint/2010/main">
+    <mc:Choice Requires="p14">
+      <p:transition spd="med" p14:dur="700">
+        <p:fade/>
+      </p:transition>
+    </mc:Choice>
+    <mc:Fallback xmlns="">
+      <p:transition spd="med">
+        <p:fade/>
+      </p:transition>
+    </mc:Fallback>
+  </mc:AlternateContent>
+</p:sld>
+</file>
+
+<file path=ppt/slides/slide23.xml><?xml version="1.0" encoding="utf-8"?>
+<p:sld xmlns:a="http://schemas.openxmlformats.org/drawingml/2006/main" xmlns:r="http://schemas.openxmlformats.org/officeDocument/2006/relationships" xmlns:p="http://schemas.openxmlformats.org/presentationml/2006/main">
+  <p:cSld>
+    <p:spTree>
+      <p:nvGrpSpPr>
+        <p:cNvPr id="1" name=""/>
+        <p:cNvGrpSpPr/>
+        <p:nvPr/>
+      </p:nvGrpSpPr>
+      <p:grpSpPr>
+        <a:xfrm>
+          <a:off x="0" y="0"/>
+          <a:ext cx="0" cy="0"/>
+          <a:chOff x="0" y="0"/>
+          <a:chExt cx="0" cy="0"/>
+        </a:xfrm>
+      </p:grpSpPr>
+      <p:sp>
+        <p:nvSpPr>
+          <p:cNvPr id="3" name="Text Placeholder 2"/>
+          <p:cNvSpPr>
+            <a:spLocks noGrp="1"/>
+          </p:cNvSpPr>
+          <p:nvPr>
+            <p:ph type="body" sz="quarter" idx="10"/>
+          </p:nvPr>
+        </p:nvSpPr>
+        <p:spPr/>
+        <p:txBody>
+          <a:bodyPr/>
+          <a:lstStyle/>
+          <a:p>
+            <a:r>
+              <a:rPr lang="zh-TW" altLang="en-US" dirty="0"/>
+              <a:t>實驗結果整理</a:t>
+            </a:r>
+            <a:endParaRPr lang="en-US" altLang="zh-TW" dirty="0"/>
+          </a:p>
+        </p:txBody>
+      </p:sp>
+      <p:sp>
+        <p:nvSpPr>
+          <p:cNvPr id="20" name="Title 1">
+            <a:extLst>
+              <a:ext uri="{FF2B5EF4-FFF2-40B4-BE49-F238E27FC236}">
+                <a16:creationId xmlns:a16="http://schemas.microsoft.com/office/drawing/2014/main" id="{89183AB5-A3B1-49E3-BFF5-DCB6C3D7B5B5}"/>
+              </a:ext>
+            </a:extLst>
+          </p:cNvPr>
+          <p:cNvSpPr txBox="1">
+            <a:spLocks/>
+          </p:cNvSpPr>
+          <p:nvPr/>
+        </p:nvSpPr>
+        <p:spPr>
+          <a:xfrm>
+            <a:off x="2120860" y="1349388"/>
+            <a:ext cx="4127541" cy="1140696"/>
+          </a:xfrm>
+          <a:prstGeom prst="rect">
+            <a:avLst/>
+          </a:prstGeom>
+        </p:spPr>
+        <p:txBody>
+          <a:bodyPr vert="horz" lIns="0" tIns="45720" rIns="0" bIns="45720" rtlCol="0" anchor="t">
+            <a:noAutofit/>
+          </a:bodyPr>
+          <a:lstStyle>
+            <a:lvl1pPr algn="l" defTabSz="914377" rtl="0" eaLnBrk="1" latinLnBrk="0" hangingPunct="1">
+              <a:lnSpc>
+                <a:spcPct val="90000"/>
+              </a:lnSpc>
+              <a:spcBef>
+                <a:spcPct val="0"/>
+              </a:spcBef>
+              <a:buNone/>
+              <a:defRPr sz="3200" b="0" i="0" kern="1200" spc="600">
+                <a:solidFill>
+                  <a:schemeClr val="tx1"/>
+                </a:solidFill>
+                <a:latin typeface="Cinzel" charset="0"/>
+                <a:ea typeface="Cinzel" charset="0"/>
+                <a:cs typeface="Cinzel" charset="0"/>
+              </a:defRPr>
+            </a:lvl1pPr>
+          </a:lstStyle>
+          <a:p>
+            <a:r>
+              <a:rPr lang="en-US" altLang="zh-TW" sz="4400" b="1" spc="300" dirty="0">
+                <a:solidFill>
+                  <a:schemeClr val="tx1">
+                    <a:lumMod val="95000"/>
+                    <a:lumOff val="5000"/>
+                  </a:schemeClr>
+                </a:solidFill>
+                <a:latin typeface="Yu Gothic UI Light" panose="020B0300000000000000" pitchFamily="34" charset="-128"/>
+                <a:ea typeface="Yu Gothic UI Light" panose="020B0300000000000000" pitchFamily="34" charset="-128"/>
+                <a:cs typeface="+mn-cs"/>
+              </a:rPr>
+              <a:t>Supp</a:t>
+            </a:r>
+            <a:br>
+              <a:rPr lang="en-US" altLang="zh-TW" sz="4400" b="1" spc="300" dirty="0">
+                <a:solidFill>
+                  <a:schemeClr val="tx1">
+                    <a:lumMod val="95000"/>
+                    <a:lumOff val="5000"/>
+                  </a:schemeClr>
+                </a:solidFill>
+                <a:latin typeface="Yu Gothic UI Light" panose="020B0300000000000000" pitchFamily="34" charset="-128"/>
+                <a:ea typeface="Yu Gothic UI Light" panose="020B0300000000000000" pitchFamily="34" charset="-128"/>
+                <a:cs typeface="+mn-cs"/>
+              </a:rPr>
+            </a:br>
+            <a:endParaRPr lang="en-US" sz="4400" b="1" spc="300" dirty="0">
+              <a:solidFill>
+                <a:schemeClr val="tx1">
+                  <a:lumMod val="95000"/>
+                  <a:lumOff val="5000"/>
+                </a:schemeClr>
+              </a:solidFill>
+              <a:latin typeface="Yu Gothic UI Light" panose="020B0300000000000000" pitchFamily="34" charset="-128"/>
+              <a:ea typeface="Yu Gothic UI Light" panose="020B0300000000000000" pitchFamily="34" charset="-128"/>
+              <a:cs typeface="+mn-cs"/>
+            </a:endParaRPr>
+          </a:p>
+        </p:txBody>
+      </p:sp>
+      <p:sp>
+        <p:nvSpPr>
+          <p:cNvPr id="2" name="文字方塊 1">
+            <a:extLst>
+              <a:ext uri="{FF2B5EF4-FFF2-40B4-BE49-F238E27FC236}">
+                <a16:creationId xmlns:a16="http://schemas.microsoft.com/office/drawing/2014/main" id="{B0D592BF-13F8-49C0-A366-A7BCDDB4258E}"/>
+              </a:ext>
+            </a:extLst>
+          </p:cNvPr>
+          <p:cNvSpPr txBox="1"/>
+          <p:nvPr/>
+        </p:nvSpPr>
+        <p:spPr>
+          <a:xfrm>
+            <a:off x="1996911" y="2290965"/>
+            <a:ext cx="9173852" cy="4934684"/>
+          </a:xfrm>
+          <a:prstGeom prst="rect">
+            <a:avLst/>
+          </a:prstGeom>
+          <a:noFill/>
+        </p:spPr>
+        <p:txBody>
+          <a:bodyPr wrap="square" rtlCol="0">
+            <a:spAutoFit/>
+          </a:bodyPr>
+          <a:lstStyle/>
+          <a:p>
+            <a:pPr lvl="0"/>
+            <a:r>
+              <a:rPr lang="en-US" altLang="zh-TW" sz="1200" dirty="0">
+                <a:latin typeface="Yu Gothic UI" panose="020B0500000000000000" pitchFamily="34" charset="-128"/>
+                <a:ea typeface="Yu Gothic UI" panose="020B0500000000000000" pitchFamily="34" charset="-128"/>
+              </a:rPr>
+              <a:t>“The Zika outbreak, spread by the Aedes aegypti mosquito, highlights the need to</a:t>
+            </a:r>
+          </a:p>
+          <a:p>
+            <a:pPr lvl="0">
+              <a:spcBef>
+                <a:spcPts val="1600"/>
+              </a:spcBef>
+            </a:pPr>
+            <a:r>
+              <a:rPr lang="en-US" altLang="zh-TW" sz="1200" dirty="0">
+                <a:latin typeface="Yu Gothic UI" panose="020B0500000000000000" pitchFamily="34" charset="-128"/>
+                <a:ea typeface="Yu Gothic UI" panose="020B0500000000000000" pitchFamily="34" charset="-128"/>
+              </a:rPr>
+              <a:t>create high-quality assemblies of large genomes in a rapid and cost-effective way. Here</a:t>
+            </a:r>
+          </a:p>
+          <a:p>
+            <a:pPr lvl="0">
+              <a:spcBef>
+                <a:spcPts val="1600"/>
+              </a:spcBef>
+            </a:pPr>
+            <a:r>
+              <a:rPr lang="en-US" altLang="zh-TW" sz="1200" dirty="0">
+                <a:latin typeface="Yu Gothic UI" panose="020B0500000000000000" pitchFamily="34" charset="-128"/>
+                <a:ea typeface="Yu Gothic UI" panose="020B0500000000000000" pitchFamily="34" charset="-128"/>
+              </a:rPr>
+              <a:t>we combine Hi-C data with existing draft assemblies to generate chromosome-length</a:t>
+            </a:r>
+          </a:p>
+          <a:p>
+            <a:pPr lvl="0">
+              <a:spcBef>
+                <a:spcPts val="1600"/>
+              </a:spcBef>
+            </a:pPr>
+            <a:r>
+              <a:rPr lang="en-US" altLang="zh-TW" sz="1200" dirty="0">
+                <a:latin typeface="Yu Gothic UI" panose="020B0500000000000000" pitchFamily="34" charset="-128"/>
+                <a:ea typeface="Yu Gothic UI" panose="020B0500000000000000" pitchFamily="34" charset="-128"/>
+              </a:rPr>
+              <a:t>scaffolds. We validate this method by assembling a human genome, de novo, from short</a:t>
+            </a:r>
+          </a:p>
+          <a:p>
+            <a:pPr lvl="0">
+              <a:spcBef>
+                <a:spcPts val="1600"/>
+              </a:spcBef>
+            </a:pPr>
+            <a:r>
+              <a:rPr lang="en-US" altLang="zh-TW" sz="1200" dirty="0">
+                <a:latin typeface="Yu Gothic UI" panose="020B0500000000000000" pitchFamily="34" charset="-128"/>
+                <a:ea typeface="Yu Gothic UI" panose="020B0500000000000000" pitchFamily="34" charset="-128"/>
+              </a:rPr>
+              <a:t>reads alone (67× coverage). We then combine our method with draft sequences to</a:t>
+            </a:r>
+          </a:p>
+          <a:p>
+            <a:pPr lvl="0">
+              <a:spcBef>
+                <a:spcPts val="1600"/>
+              </a:spcBef>
+            </a:pPr>
+            <a:r>
+              <a:rPr lang="en-US" altLang="zh-TW" sz="1200" dirty="0">
+                <a:latin typeface="Yu Gothic UI" panose="020B0500000000000000" pitchFamily="34" charset="-128"/>
+                <a:ea typeface="Yu Gothic UI" panose="020B0500000000000000" pitchFamily="34" charset="-128"/>
+              </a:rPr>
+              <a:t>create genome assemblies of the mosquito disease vectors Ae. aegypti and Culex</a:t>
+            </a:r>
+          </a:p>
+          <a:p>
+            <a:pPr lvl="0">
+              <a:spcBef>
+                <a:spcPts val="1600"/>
+              </a:spcBef>
+            </a:pPr>
+            <a:r>
+              <a:rPr lang="en-US" altLang="zh-TW" sz="1200" dirty="0" err="1">
+                <a:latin typeface="Yu Gothic UI" panose="020B0500000000000000" pitchFamily="34" charset="-128"/>
+                <a:ea typeface="Yu Gothic UI" panose="020B0500000000000000" pitchFamily="34" charset="-128"/>
+              </a:rPr>
+              <a:t>quinquefasciatus</a:t>
+            </a:r>
+            <a:r>
+              <a:rPr lang="en-US" altLang="zh-TW" sz="1200" dirty="0">
+                <a:latin typeface="Yu Gothic UI" panose="020B0500000000000000" pitchFamily="34" charset="-128"/>
+                <a:ea typeface="Yu Gothic UI" panose="020B0500000000000000" pitchFamily="34" charset="-128"/>
+              </a:rPr>
+              <a:t>, each consisting of three scaffolds corresponding to the three</a:t>
+            </a:r>
+          </a:p>
+          <a:p>
+            <a:pPr lvl="0">
+              <a:spcBef>
+                <a:spcPts val="1600"/>
+              </a:spcBef>
+            </a:pPr>
+            <a:r>
+              <a:rPr lang="en-US" altLang="zh-TW" sz="1200" dirty="0">
+                <a:latin typeface="Yu Gothic UI" panose="020B0500000000000000" pitchFamily="34" charset="-128"/>
+                <a:ea typeface="Yu Gothic UI" panose="020B0500000000000000" pitchFamily="34" charset="-128"/>
+              </a:rPr>
+              <a:t>chromosomes in each species. These assemblies indicate that almost all genomic</a:t>
+            </a:r>
+          </a:p>
+          <a:p>
+            <a:pPr lvl="0">
+              <a:spcBef>
+                <a:spcPts val="1600"/>
+              </a:spcBef>
+            </a:pPr>
+            <a:r>
+              <a:rPr lang="en-US" altLang="zh-TW" sz="1200" dirty="0">
+                <a:latin typeface="Yu Gothic UI" panose="020B0500000000000000" pitchFamily="34" charset="-128"/>
+                <a:ea typeface="Yu Gothic UI" panose="020B0500000000000000" pitchFamily="34" charset="-128"/>
+              </a:rPr>
+              <a:t>rearrangements among these species occur within, rather than between, chromosome</a:t>
+            </a:r>
+          </a:p>
+          <a:p>
+            <a:pPr lvl="0">
+              <a:spcBef>
+                <a:spcPts val="1600"/>
+              </a:spcBef>
+            </a:pPr>
+            <a:r>
+              <a:rPr lang="en-US" altLang="zh-TW" sz="1200" dirty="0">
+                <a:latin typeface="Yu Gothic UI" panose="020B0500000000000000" pitchFamily="34" charset="-128"/>
+                <a:ea typeface="Yu Gothic UI" panose="020B0500000000000000" pitchFamily="34" charset="-128"/>
+              </a:rPr>
+              <a:t>arms. The genome assembly procedure we describe is fast, inexpensive, and accurate,</a:t>
+            </a:r>
+          </a:p>
+          <a:p>
+            <a:pPr lvl="0">
+              <a:spcBef>
+                <a:spcPts val="1600"/>
+              </a:spcBef>
+              <a:spcAft>
+                <a:spcPts val="1600"/>
+              </a:spcAft>
+            </a:pPr>
+            <a:r>
+              <a:rPr lang="en-US" altLang="zh-TW" sz="1200" dirty="0">
+                <a:latin typeface="Yu Gothic UI" panose="020B0500000000000000" pitchFamily="34" charset="-128"/>
+                <a:ea typeface="Yu Gothic UI" panose="020B0500000000000000" pitchFamily="34" charset="-128"/>
+              </a:rPr>
+              <a:t>and can be applied to many species.”</a:t>
+            </a:r>
+          </a:p>
+          <a:p>
+            <a:endParaRPr lang="en-US" altLang="zh-TW" b="1" dirty="0">
+              <a:latin typeface="Yu Gothic UI Light" panose="020B0300000000000000" pitchFamily="34" charset="-128"/>
+              <a:ea typeface="Yu Gothic UI Light" panose="020B0300000000000000" pitchFamily="34" charset="-128"/>
+            </a:endParaRPr>
+          </a:p>
+          <a:p>
+            <a:pPr marL="342900" indent="-342900">
+              <a:buFont typeface="+mj-lt"/>
+              <a:buAutoNum type="arabicPeriod"/>
+            </a:pPr>
+            <a:endParaRPr lang="zh-TW" altLang="en-US" b="1" dirty="0">
+              <a:latin typeface="Yu Gothic UI Light" panose="020B0300000000000000" pitchFamily="34" charset="-128"/>
+              <a:ea typeface="Yu Gothic UI Light" panose="020B0300000000000000" pitchFamily="34" charset="-128"/>
+            </a:endParaRPr>
+          </a:p>
+        </p:txBody>
+      </p:sp>
+    </p:spTree>
+    <p:extLst>
+      <p:ext uri="{BB962C8B-B14F-4D97-AF65-F5344CB8AC3E}">
+        <p14:creationId xmlns:p14="http://schemas.microsoft.com/office/powerpoint/2010/main" val="95228357"/>
+      </p:ext>
+    </p:extLst>
+  </p:cSld>
+  <p:clrMapOvr>
+    <a:masterClrMapping/>
+  </p:clrMapOvr>
+  <mc:AlternateContent xmlns:mc="http://schemas.openxmlformats.org/markup-compatibility/2006" xmlns:p14="http://schemas.microsoft.com/office/powerpoint/2010/main">
+    <mc:Choice Requires="p14">
+      <p:transition spd="med" p14:dur="700">
+        <p:fade/>
+      </p:transition>
+    </mc:Choice>
+    <mc:Fallback xmlns="">
+      <p:transition spd="med">
+        <p:fade/>
+      </p:transition>
+    </mc:Fallback>
+  </mc:AlternateContent>
+</p:sld>
+</file>
+
+<file path=ppt/slides/slide24.xml><?xml version="1.0" encoding="utf-8"?>
+<p:sld xmlns:a="http://schemas.openxmlformats.org/drawingml/2006/main" xmlns:r="http://schemas.openxmlformats.org/officeDocument/2006/relationships" xmlns:p="http://schemas.openxmlformats.org/presentationml/2006/main">
+  <p:cSld>
+    <p:spTree>
+      <p:nvGrpSpPr>
+        <p:cNvPr id="1" name=""/>
+        <p:cNvGrpSpPr/>
+        <p:nvPr/>
+      </p:nvGrpSpPr>
+      <p:grpSpPr>
+        <a:xfrm>
+          <a:off x="0" y="0"/>
+          <a:ext cx="0" cy="0"/>
+          <a:chOff x="0" y="0"/>
+          <a:chExt cx="0" cy="0"/>
+        </a:xfrm>
+      </p:grpSpPr>
+      <p:pic>
+        <p:nvPicPr>
+          <p:cNvPr id="2" name="圖片 1">
+            <a:extLst>
+              <a:ext uri="{FF2B5EF4-FFF2-40B4-BE49-F238E27FC236}">
+                <a16:creationId xmlns:a16="http://schemas.microsoft.com/office/drawing/2014/main" id="{377250D2-4A33-C742-A16F-4A2BCCE3CAFF}"/>
+              </a:ext>
+            </a:extLst>
+          </p:cNvPr>
+          <p:cNvPicPr>
+            <a:picLocks noChangeAspect="1"/>
+          </p:cNvPicPr>
+          <p:nvPr/>
+        </p:nvPicPr>
+        <p:blipFill rotWithShape="1">
+          <a:blip r:embed="rId2"/>
+          <a:srcRect t="1695"/>
+          <a:stretch/>
+        </p:blipFill>
+        <p:spPr>
+          <a:xfrm>
+            <a:off x="2047374" y="529388"/>
+            <a:ext cx="8059152" cy="5736017"/>
+          </a:xfrm>
+          <a:prstGeom prst="rect">
+            <a:avLst/>
+          </a:prstGeom>
+        </p:spPr>
+      </p:pic>
+      <p:sp>
+        <p:nvSpPr>
+          <p:cNvPr id="3" name="Title 1">
+            <a:extLst>
+              <a:ext uri="{FF2B5EF4-FFF2-40B4-BE49-F238E27FC236}">
+                <a16:creationId xmlns:a16="http://schemas.microsoft.com/office/drawing/2014/main" id="{64F929EC-6415-4D98-A4CC-059F62C96802}"/>
+              </a:ext>
+            </a:extLst>
+          </p:cNvPr>
+          <p:cNvSpPr txBox="1">
+            <a:spLocks/>
+          </p:cNvSpPr>
+          <p:nvPr/>
+        </p:nvSpPr>
+        <p:spPr>
+          <a:xfrm>
+            <a:off x="791680" y="559076"/>
+            <a:ext cx="4127541" cy="1140696"/>
+          </a:xfrm>
+          <a:prstGeom prst="rect">
+            <a:avLst/>
+          </a:prstGeom>
+        </p:spPr>
+        <p:txBody>
+          <a:bodyPr vert="horz" lIns="0" tIns="45720" rIns="0" bIns="45720" rtlCol="0" anchor="t">
+            <a:noAutofit/>
+          </a:bodyPr>
+          <a:lstStyle>
+            <a:lvl1pPr algn="l" defTabSz="914377" rtl="0" eaLnBrk="1" latinLnBrk="0" hangingPunct="1">
+              <a:lnSpc>
+                <a:spcPct val="90000"/>
+              </a:lnSpc>
+              <a:spcBef>
+                <a:spcPct val="0"/>
+              </a:spcBef>
+              <a:buNone/>
+              <a:defRPr sz="3200" b="0" i="0" kern="1200" spc="600">
+                <a:solidFill>
+                  <a:schemeClr val="tx1"/>
+                </a:solidFill>
+                <a:latin typeface="Cinzel" charset="0"/>
+                <a:ea typeface="Cinzel" charset="0"/>
+                <a:cs typeface="Cinzel" charset="0"/>
+              </a:defRPr>
+            </a:lvl1pPr>
+          </a:lstStyle>
+          <a:p>
+            <a:r>
+              <a:rPr lang="en-US" altLang="zh-TW" sz="4400" b="1" spc="300" dirty="0">
+                <a:solidFill>
+                  <a:schemeClr val="tx1">
+                    <a:lumMod val="95000"/>
+                    <a:lumOff val="5000"/>
+                  </a:schemeClr>
+                </a:solidFill>
+                <a:latin typeface="Yu Gothic UI Light" panose="020B0300000000000000" pitchFamily="34" charset="-128"/>
+                <a:ea typeface="Yu Gothic UI Light" panose="020B0300000000000000" pitchFamily="34" charset="-128"/>
+                <a:cs typeface="+mn-cs"/>
+              </a:rPr>
+              <a:t>Supp2</a:t>
+            </a:r>
+            <a:br>
+              <a:rPr lang="en-US" altLang="zh-TW" sz="4400" b="1" spc="300" dirty="0">
+                <a:solidFill>
+                  <a:schemeClr val="tx1">
+                    <a:lumMod val="95000"/>
+                    <a:lumOff val="5000"/>
+                  </a:schemeClr>
+                </a:solidFill>
+                <a:latin typeface="Yu Gothic UI Light" panose="020B0300000000000000" pitchFamily="34" charset="-128"/>
+                <a:ea typeface="Yu Gothic UI Light" panose="020B0300000000000000" pitchFamily="34" charset="-128"/>
+                <a:cs typeface="+mn-cs"/>
+              </a:rPr>
+            </a:br>
+            <a:endParaRPr lang="en-US" sz="4400" b="1" spc="300" dirty="0">
+              <a:solidFill>
+                <a:schemeClr val="tx1">
+                  <a:lumMod val="95000"/>
+                  <a:lumOff val="5000"/>
+                </a:schemeClr>
+              </a:solidFill>
+              <a:latin typeface="Yu Gothic UI Light" panose="020B0300000000000000" pitchFamily="34" charset="-128"/>
+              <a:ea typeface="Yu Gothic UI Light" panose="020B0300000000000000" pitchFamily="34" charset="-128"/>
+              <a:cs typeface="+mn-cs"/>
+            </a:endParaRPr>
+          </a:p>
+        </p:txBody>
+      </p:sp>
+    </p:spTree>
+    <p:extLst>
+      <p:ext uri="{BB962C8B-B14F-4D97-AF65-F5344CB8AC3E}">
+        <p14:creationId xmlns:p14="http://schemas.microsoft.com/office/powerpoint/2010/main" val="2838382673"/>
+      </p:ext>
+    </p:extLst>
+  </p:cSld>
+  <p:clrMapOvr>
+    <a:masterClrMapping/>
+  </p:clrMapOvr>
+</p:sld>
+</file>
+
+<file path=ppt/slides/slide25.xml><?xml version="1.0" encoding="utf-8"?>
+<p:sld xmlns:a="http://schemas.openxmlformats.org/drawingml/2006/main" xmlns:r="http://schemas.openxmlformats.org/officeDocument/2006/relationships" xmlns:p="http://schemas.openxmlformats.org/presentationml/2006/main">
+  <p:cSld>
+    <p:spTree>
+      <p:nvGrpSpPr>
+        <p:cNvPr id="1" name=""/>
+        <p:cNvGrpSpPr/>
+        <p:nvPr/>
+      </p:nvGrpSpPr>
+      <p:grpSpPr>
+        <a:xfrm>
+          <a:off x="0" y="0"/>
+          <a:ext cx="0" cy="0"/>
+          <a:chOff x="0" y="0"/>
+          <a:chExt cx="0" cy="0"/>
+        </a:xfrm>
+      </p:grpSpPr>
+      <p:pic>
+        <p:nvPicPr>
+          <p:cNvPr id="2" name="圖片 1">
+            <a:extLst>
+              <a:ext uri="{FF2B5EF4-FFF2-40B4-BE49-F238E27FC236}">
+                <a16:creationId xmlns:a16="http://schemas.microsoft.com/office/drawing/2014/main" id="{710DCAA4-84D5-304E-95E8-898BB6CF651F}"/>
+              </a:ext>
+            </a:extLst>
+          </p:cNvPr>
+          <p:cNvPicPr>
+            <a:picLocks noChangeAspect="1"/>
+          </p:cNvPicPr>
+          <p:nvPr/>
+        </p:nvPicPr>
+        <p:blipFill>
+          <a:blip r:embed="rId3"/>
+          <a:stretch>
+            <a:fillRect/>
+          </a:stretch>
+        </p:blipFill>
+        <p:spPr>
+          <a:xfrm>
+            <a:off x="3980234" y="0"/>
+            <a:ext cx="4231532" cy="6858000"/>
+          </a:xfrm>
+          <a:prstGeom prst="rect">
+            <a:avLst/>
+          </a:prstGeom>
+        </p:spPr>
+      </p:pic>
+      <p:sp>
+        <p:nvSpPr>
+          <p:cNvPr id="3" name="Title 1">
+            <a:extLst>
+              <a:ext uri="{FF2B5EF4-FFF2-40B4-BE49-F238E27FC236}">
+                <a16:creationId xmlns:a16="http://schemas.microsoft.com/office/drawing/2014/main" id="{397AAA57-ECF6-4E60-927F-F2DFBB38A471}"/>
+              </a:ext>
+            </a:extLst>
+          </p:cNvPr>
+          <p:cNvSpPr txBox="1">
+            <a:spLocks/>
+          </p:cNvSpPr>
+          <p:nvPr/>
+        </p:nvSpPr>
+        <p:spPr>
+          <a:xfrm>
+            <a:off x="791680" y="559076"/>
+            <a:ext cx="4127541" cy="1140696"/>
+          </a:xfrm>
+          <a:prstGeom prst="rect">
+            <a:avLst/>
+          </a:prstGeom>
+        </p:spPr>
+        <p:txBody>
+          <a:bodyPr vert="horz" lIns="0" tIns="45720" rIns="0" bIns="45720" rtlCol="0" anchor="t">
+            <a:noAutofit/>
+          </a:bodyPr>
+          <a:lstStyle>
+            <a:lvl1pPr algn="l" defTabSz="914377" rtl="0" eaLnBrk="1" latinLnBrk="0" hangingPunct="1">
+              <a:lnSpc>
+                <a:spcPct val="90000"/>
+              </a:lnSpc>
+              <a:spcBef>
+                <a:spcPct val="0"/>
+              </a:spcBef>
+              <a:buNone/>
+              <a:defRPr sz="3200" b="0" i="0" kern="1200" spc="600">
+                <a:solidFill>
+                  <a:schemeClr val="tx1"/>
+                </a:solidFill>
+                <a:latin typeface="Cinzel" charset="0"/>
+                <a:ea typeface="Cinzel" charset="0"/>
+                <a:cs typeface="Cinzel" charset="0"/>
+              </a:defRPr>
+            </a:lvl1pPr>
+          </a:lstStyle>
+          <a:p>
+            <a:r>
+              <a:rPr lang="en-US" altLang="zh-TW" sz="4400" b="1" spc="300" dirty="0">
+                <a:solidFill>
+                  <a:schemeClr val="tx1">
+                    <a:lumMod val="95000"/>
+                    <a:lumOff val="5000"/>
+                  </a:schemeClr>
+                </a:solidFill>
+                <a:latin typeface="Yu Gothic UI Light" panose="020B0300000000000000" pitchFamily="34" charset="-128"/>
+                <a:ea typeface="Yu Gothic UI Light" panose="020B0300000000000000" pitchFamily="34" charset="-128"/>
+                <a:cs typeface="+mn-cs"/>
+              </a:rPr>
+              <a:t>Supp2</a:t>
+            </a:r>
+            <a:br>
+              <a:rPr lang="en-US" altLang="zh-TW" sz="4400" b="1" spc="300" dirty="0">
+                <a:solidFill>
+                  <a:schemeClr val="tx1">
+                    <a:lumMod val="95000"/>
+                    <a:lumOff val="5000"/>
+                  </a:schemeClr>
+                </a:solidFill>
+                <a:latin typeface="Yu Gothic UI Light" panose="020B0300000000000000" pitchFamily="34" charset="-128"/>
+                <a:ea typeface="Yu Gothic UI Light" panose="020B0300000000000000" pitchFamily="34" charset="-128"/>
+                <a:cs typeface="+mn-cs"/>
+              </a:rPr>
+            </a:br>
+            <a:endParaRPr lang="en-US" sz="4400" b="1" spc="300" dirty="0">
+              <a:solidFill>
+                <a:schemeClr val="tx1">
+                  <a:lumMod val="95000"/>
+                  <a:lumOff val="5000"/>
+                </a:schemeClr>
+              </a:solidFill>
+              <a:latin typeface="Yu Gothic UI Light" panose="020B0300000000000000" pitchFamily="34" charset="-128"/>
+              <a:ea typeface="Yu Gothic UI Light" panose="020B0300000000000000" pitchFamily="34" charset="-128"/>
+              <a:cs typeface="+mn-cs"/>
+            </a:endParaRPr>
+          </a:p>
+        </p:txBody>
+      </p:sp>
+    </p:spTree>
+    <p:extLst>
+      <p:ext uri="{BB962C8B-B14F-4D97-AF65-F5344CB8AC3E}">
+        <p14:creationId xmlns:p14="http://schemas.microsoft.com/office/powerpoint/2010/main" val="2358350020"/>
+      </p:ext>
+    </p:extLst>
+  </p:cSld>
+  <p:clrMapOvr>
+    <a:masterClrMapping/>
+  </p:clrMapOvr>
+</p:sld>
+</file>
+
+<file path=ppt/slides/slide26.xml><?xml version="1.0" encoding="utf-8"?>
+<p:sld xmlns:a="http://schemas.openxmlformats.org/drawingml/2006/main" xmlns:r="http://schemas.openxmlformats.org/officeDocument/2006/relationships" xmlns:p="http://schemas.openxmlformats.org/presentationml/2006/main">
+  <p:cSld>
+    <p:spTree>
+      <p:nvGrpSpPr>
+        <p:cNvPr id="1" name=""/>
+        <p:cNvGrpSpPr/>
+        <p:nvPr/>
+      </p:nvGrpSpPr>
+      <p:grpSpPr>
+        <a:xfrm>
+          <a:off x="0" y="0"/>
+          <a:ext cx="0" cy="0"/>
+          <a:chOff x="0" y="0"/>
+          <a:chExt cx="0" cy="0"/>
+        </a:xfrm>
+      </p:grpSpPr>
+      <p:pic>
+        <p:nvPicPr>
+          <p:cNvPr id="2" name="圖片 1">
+            <a:extLst>
+              <a:ext uri="{FF2B5EF4-FFF2-40B4-BE49-F238E27FC236}">
+                <a16:creationId xmlns:a16="http://schemas.microsoft.com/office/drawing/2014/main" id="{42D348A6-DBC4-0C48-BAE0-AEFC96F2F2E3}"/>
+              </a:ext>
+            </a:extLst>
+          </p:cNvPr>
+          <p:cNvPicPr>
+            <a:picLocks noChangeAspect="1"/>
+          </p:cNvPicPr>
+          <p:nvPr/>
+        </p:nvPicPr>
+        <p:blipFill>
+          <a:blip r:embed="rId3"/>
+          <a:stretch>
+            <a:fillRect/>
+          </a:stretch>
+        </p:blipFill>
+        <p:spPr>
+          <a:xfrm>
+            <a:off x="2858407" y="570593"/>
+            <a:ext cx="6845300" cy="5956300"/>
+          </a:xfrm>
+          <a:prstGeom prst="rect">
+            <a:avLst/>
+          </a:prstGeom>
+        </p:spPr>
+      </p:pic>
+      <p:sp>
+        <p:nvSpPr>
+          <p:cNvPr id="3" name="Title 1">
+            <a:extLst>
+              <a:ext uri="{FF2B5EF4-FFF2-40B4-BE49-F238E27FC236}">
+                <a16:creationId xmlns:a16="http://schemas.microsoft.com/office/drawing/2014/main" id="{A5C09270-632E-4995-8989-9894913D47BE}"/>
+              </a:ext>
+            </a:extLst>
+          </p:cNvPr>
+          <p:cNvSpPr txBox="1">
+            <a:spLocks/>
+          </p:cNvSpPr>
+          <p:nvPr/>
+        </p:nvSpPr>
+        <p:spPr>
+          <a:xfrm>
+            <a:off x="791680" y="559076"/>
+            <a:ext cx="4127541" cy="1140696"/>
+          </a:xfrm>
+          <a:prstGeom prst="rect">
+            <a:avLst/>
+          </a:prstGeom>
+        </p:spPr>
+        <p:txBody>
+          <a:bodyPr vert="horz" lIns="0" tIns="45720" rIns="0" bIns="45720" rtlCol="0" anchor="t">
+            <a:noAutofit/>
+          </a:bodyPr>
+          <a:lstStyle>
+            <a:lvl1pPr algn="l" defTabSz="914377" rtl="0" eaLnBrk="1" latinLnBrk="0" hangingPunct="1">
+              <a:lnSpc>
+                <a:spcPct val="90000"/>
+              </a:lnSpc>
+              <a:spcBef>
+                <a:spcPct val="0"/>
+              </a:spcBef>
+              <a:buNone/>
+              <a:defRPr sz="3200" b="0" i="0" kern="1200" spc="600">
+                <a:solidFill>
+                  <a:schemeClr val="tx1"/>
+                </a:solidFill>
+                <a:latin typeface="Cinzel" charset="0"/>
+                <a:ea typeface="Cinzel" charset="0"/>
+                <a:cs typeface="Cinzel" charset="0"/>
+              </a:defRPr>
+            </a:lvl1pPr>
+          </a:lstStyle>
+          <a:p>
+            <a:r>
+              <a:rPr lang="en-US" altLang="zh-TW" sz="4400" b="1" spc="300" dirty="0">
+                <a:solidFill>
+                  <a:schemeClr val="tx1">
+                    <a:lumMod val="95000"/>
+                    <a:lumOff val="5000"/>
+                  </a:schemeClr>
+                </a:solidFill>
+                <a:latin typeface="Yu Gothic UI Light" panose="020B0300000000000000" pitchFamily="34" charset="-128"/>
+                <a:ea typeface="Yu Gothic UI Light" panose="020B0300000000000000" pitchFamily="34" charset="-128"/>
+                <a:cs typeface="+mn-cs"/>
+              </a:rPr>
+              <a:t>Supp2</a:t>
+            </a:r>
+            <a:br>
+              <a:rPr lang="en-US" altLang="zh-TW" sz="4400" b="1" spc="300" dirty="0">
+                <a:solidFill>
+                  <a:schemeClr val="tx1">
+                    <a:lumMod val="95000"/>
+                    <a:lumOff val="5000"/>
+                  </a:schemeClr>
+                </a:solidFill>
+                <a:latin typeface="Yu Gothic UI Light" panose="020B0300000000000000" pitchFamily="34" charset="-128"/>
+                <a:ea typeface="Yu Gothic UI Light" panose="020B0300000000000000" pitchFamily="34" charset="-128"/>
+                <a:cs typeface="+mn-cs"/>
+              </a:rPr>
+            </a:br>
+            <a:endParaRPr lang="en-US" sz="4400" b="1" spc="300" dirty="0">
+              <a:solidFill>
+                <a:schemeClr val="tx1">
+                  <a:lumMod val="95000"/>
+                  <a:lumOff val="5000"/>
+                </a:schemeClr>
+              </a:solidFill>
+              <a:latin typeface="Yu Gothic UI Light" panose="020B0300000000000000" pitchFamily="34" charset="-128"/>
+              <a:ea typeface="Yu Gothic UI Light" panose="020B0300000000000000" pitchFamily="34" charset="-128"/>
+              <a:cs typeface="+mn-cs"/>
+            </a:endParaRPr>
+          </a:p>
+        </p:txBody>
+      </p:sp>
+    </p:spTree>
+    <p:extLst>
+      <p:ext uri="{BB962C8B-B14F-4D97-AF65-F5344CB8AC3E}">
+        <p14:creationId xmlns:p14="http://schemas.microsoft.com/office/powerpoint/2010/main" val="798563157"/>
+      </p:ext>
+    </p:extLst>
+  </p:cSld>
+  <p:clrMapOvr>
+    <a:masterClrMapping/>
+  </p:clrMapOvr>
+</p:sld>
+</file>
+
+<file path=ppt/slides/slide27.xml><?xml version="1.0" encoding="utf-8"?>
+<p:sld xmlns:a="http://schemas.openxmlformats.org/drawingml/2006/main" xmlns:r="http://schemas.openxmlformats.org/officeDocument/2006/relationships" xmlns:p="http://schemas.openxmlformats.org/presentationml/2006/main">
+  <p:cSld>
+    <p:spTree>
+      <p:nvGrpSpPr>
+        <p:cNvPr id="1" name=""/>
+        <p:cNvGrpSpPr/>
+        <p:nvPr/>
+      </p:nvGrpSpPr>
+      <p:grpSpPr>
+        <a:xfrm>
+          <a:off x="0" y="0"/>
+          <a:ext cx="0" cy="0"/>
+          <a:chOff x="0" y="0"/>
+          <a:chExt cx="0" cy="0"/>
+        </a:xfrm>
+      </p:grpSpPr>
+      <p:sp>
+        <p:nvSpPr>
+          <p:cNvPr id="3" name="內容版面配置區 2">
+            <a:extLst>
+              <a:ext uri="{FF2B5EF4-FFF2-40B4-BE49-F238E27FC236}">
+                <a16:creationId xmlns:a16="http://schemas.microsoft.com/office/drawing/2014/main" id="{678C1F39-C721-524E-A4E2-BC4336C05FDF}"/>
+              </a:ext>
+            </a:extLst>
+          </p:cNvPr>
+          <p:cNvSpPr>
+            <a:spLocks noGrp="1"/>
+          </p:cNvSpPr>
+          <p:nvPr>
+            <p:ph idx="1"/>
+          </p:nvPr>
+        </p:nvSpPr>
+        <p:spPr/>
+        <p:txBody>
+          <a:bodyPr>
+            <a:normAutofit/>
+          </a:bodyPr>
+          <a:lstStyle/>
+          <a:p>
+            <a:r>
+              <a:rPr lang="en-US" altLang="zh-TW" sz="2400" dirty="0">
+                <a:latin typeface="Yu Gothic UI Light" panose="020B0300000000000000" pitchFamily="34" charset="-128"/>
+                <a:ea typeface="Yu Gothic UI Light" panose="020B0300000000000000" pitchFamily="34" charset="-128"/>
+                <a:cs typeface="+mn-cs"/>
+              </a:rPr>
+              <a:t> provides a rapid, inexpensive methodology for generating highly accurate de novo assemblies with chromosome-length scaffolds. </a:t>
+            </a:r>
+          </a:p>
+          <a:p>
+            <a:r>
+              <a:rPr lang="en-US" altLang="zh-TW" sz="2400" dirty="0">
+                <a:latin typeface="Yu Gothic UI Light" panose="020B0300000000000000" pitchFamily="34" charset="-128"/>
+                <a:ea typeface="Yu Gothic UI Light" panose="020B0300000000000000" pitchFamily="34" charset="-128"/>
+                <a:cs typeface="+mn-cs"/>
+              </a:rPr>
+              <a:t>the current approach is not perfect for local ordering of small adjacent contigs.</a:t>
+            </a:r>
+          </a:p>
+          <a:p>
+            <a:r>
+              <a:rPr lang="en-US" altLang="zh-TW" sz="2400" dirty="0">
+                <a:latin typeface="Yu Gothic UI Light" panose="020B0300000000000000" pitchFamily="34" charset="-128"/>
+                <a:ea typeface="Yu Gothic UI Light" panose="020B0300000000000000" pitchFamily="34" charset="-128"/>
+                <a:cs typeface="+mn-cs"/>
+              </a:rPr>
+              <a:t>This might be circumvented by more sophisticated analysis of Hi-C data. Additional data (such as long or paired-end reads) could also improve the results. </a:t>
+            </a:r>
+            <a:endParaRPr lang="zh-TW" altLang="en-US" sz="2400" dirty="0">
+              <a:latin typeface="Yu Gothic UI Light" panose="020B0300000000000000" pitchFamily="34" charset="-128"/>
+              <a:ea typeface="Yu Gothic UI Light" panose="020B0300000000000000" pitchFamily="34" charset="-128"/>
+              <a:cs typeface="+mn-cs"/>
+            </a:endParaRPr>
+          </a:p>
+        </p:txBody>
+      </p:sp>
+      <p:sp>
+        <p:nvSpPr>
+          <p:cNvPr id="4" name="Title 1">
+            <a:extLst>
+              <a:ext uri="{FF2B5EF4-FFF2-40B4-BE49-F238E27FC236}">
+                <a16:creationId xmlns:a16="http://schemas.microsoft.com/office/drawing/2014/main" id="{614F7ED8-2A00-4924-A5E7-147FB797A729}"/>
+              </a:ext>
+            </a:extLst>
+          </p:cNvPr>
+          <p:cNvSpPr txBox="1">
+            <a:spLocks/>
+          </p:cNvSpPr>
+          <p:nvPr/>
+        </p:nvSpPr>
+        <p:spPr>
+          <a:xfrm>
+            <a:off x="791680" y="559076"/>
+            <a:ext cx="4127541" cy="1140696"/>
+          </a:xfrm>
+          <a:prstGeom prst="rect">
+            <a:avLst/>
+          </a:prstGeom>
+        </p:spPr>
+        <p:txBody>
+          <a:bodyPr vert="horz" lIns="0" tIns="45720" rIns="0" bIns="45720" rtlCol="0" anchor="t">
+            <a:noAutofit/>
+          </a:bodyPr>
+          <a:lstStyle>
+            <a:lvl1pPr algn="l" defTabSz="914377" rtl="0" eaLnBrk="1" latinLnBrk="0" hangingPunct="1">
+              <a:lnSpc>
+                <a:spcPct val="90000"/>
+              </a:lnSpc>
+              <a:spcBef>
+                <a:spcPct val="0"/>
+              </a:spcBef>
+              <a:buNone/>
+              <a:defRPr sz="3200" b="0" i="0" kern="1200" spc="600">
+                <a:solidFill>
+                  <a:schemeClr val="tx1"/>
+                </a:solidFill>
+                <a:latin typeface="Cinzel" charset="0"/>
+                <a:ea typeface="Cinzel" charset="0"/>
+                <a:cs typeface="Cinzel" charset="0"/>
+              </a:defRPr>
+            </a:lvl1pPr>
+          </a:lstStyle>
+          <a:p>
+            <a:r>
+              <a:rPr lang="en-US" altLang="zh-TW" sz="4400" b="1" spc="300" dirty="0">
+                <a:solidFill>
+                  <a:schemeClr val="tx1">
+                    <a:lumMod val="95000"/>
+                    <a:lumOff val="5000"/>
+                  </a:schemeClr>
+                </a:solidFill>
+                <a:latin typeface="Yu Gothic UI Light" panose="020B0300000000000000" pitchFamily="34" charset="-128"/>
+                <a:ea typeface="Yu Gothic UI Light" panose="020B0300000000000000" pitchFamily="34" charset="-128"/>
+                <a:cs typeface="+mn-cs"/>
+              </a:rPr>
+              <a:t>Supp2</a:t>
+            </a:r>
+            <a:br>
+              <a:rPr lang="en-US" altLang="zh-TW" sz="4400" b="1" spc="300" dirty="0">
+                <a:solidFill>
+                  <a:schemeClr val="tx1">
+                    <a:lumMod val="95000"/>
+                    <a:lumOff val="5000"/>
+                  </a:schemeClr>
+                </a:solidFill>
+                <a:latin typeface="Yu Gothic UI Light" panose="020B0300000000000000" pitchFamily="34" charset="-128"/>
+                <a:ea typeface="Yu Gothic UI Light" panose="020B0300000000000000" pitchFamily="34" charset="-128"/>
+                <a:cs typeface="+mn-cs"/>
+              </a:rPr>
+            </a:br>
+            <a:endParaRPr lang="en-US" sz="4400" b="1" spc="300" dirty="0">
+              <a:solidFill>
+                <a:schemeClr val="tx1">
+                  <a:lumMod val="95000"/>
+                  <a:lumOff val="5000"/>
+                </a:schemeClr>
+              </a:solidFill>
+              <a:latin typeface="Yu Gothic UI Light" panose="020B0300000000000000" pitchFamily="34" charset="-128"/>
+              <a:ea typeface="Yu Gothic UI Light" panose="020B0300000000000000" pitchFamily="34" charset="-128"/>
+              <a:cs typeface="+mn-cs"/>
+            </a:endParaRPr>
+          </a:p>
+        </p:txBody>
+      </p:sp>
+    </p:spTree>
+    <p:extLst>
+      <p:ext uri="{BB962C8B-B14F-4D97-AF65-F5344CB8AC3E}">
+        <p14:creationId xmlns:p14="http://schemas.microsoft.com/office/powerpoint/2010/main" val="1277634494"/>
+      </p:ext>
+    </p:extLst>
+  </p:cSld>
+  <p:clrMapOvr>
+    <a:masterClrMapping/>
+  </p:clrMapOvr>
+</p:sld>
+</file>
+
+<file path=ppt/slides/slide28.xml><?xml version="1.0" encoding="utf-8"?>
+<p:sld xmlns:a="http://schemas.openxmlformats.org/drawingml/2006/main" xmlns:r="http://schemas.openxmlformats.org/officeDocument/2006/relationships" xmlns:p="http://schemas.openxmlformats.org/presentationml/2006/main">
+  <p:cSld>
+    <p:spTree>
+      <p:nvGrpSpPr>
+        <p:cNvPr id="1" name=""/>
+        <p:cNvGrpSpPr/>
+        <p:nvPr/>
+      </p:nvGrpSpPr>
+      <p:grpSpPr>
+        <a:xfrm>
+          <a:off x="0" y="0"/>
+          <a:ext cx="0" cy="0"/>
+          <a:chOff x="0" y="0"/>
+          <a:chExt cx="0" cy="0"/>
+        </a:xfrm>
+      </p:grpSpPr>
+      <p:sp>
+        <p:nvSpPr>
+          <p:cNvPr id="3" name="Text Placeholder 2"/>
+          <p:cNvSpPr>
+            <a:spLocks noGrp="1"/>
+          </p:cNvSpPr>
+          <p:nvPr>
+            <p:ph type="body" sz="quarter" idx="10"/>
+          </p:nvPr>
+        </p:nvSpPr>
+        <p:spPr/>
+        <p:txBody>
+          <a:bodyPr/>
+          <a:lstStyle/>
+          <a:p>
+            <a:r>
+              <a:rPr lang="zh-TW" altLang="en-US" dirty="0"/>
+              <a:t>實驗結果整理</a:t>
+            </a:r>
+            <a:endParaRPr lang="en-US" altLang="zh-TW" dirty="0"/>
+          </a:p>
+        </p:txBody>
+      </p:sp>
+      <p:sp>
+        <p:nvSpPr>
+          <p:cNvPr id="20" name="Title 1">
+            <a:extLst>
+              <a:ext uri="{FF2B5EF4-FFF2-40B4-BE49-F238E27FC236}">
+                <a16:creationId xmlns:a16="http://schemas.microsoft.com/office/drawing/2014/main" id="{89183AB5-A3B1-49E3-BFF5-DCB6C3D7B5B5}"/>
+              </a:ext>
+            </a:extLst>
+          </p:cNvPr>
+          <p:cNvSpPr txBox="1">
+            <a:spLocks/>
+          </p:cNvSpPr>
+          <p:nvPr/>
+        </p:nvSpPr>
+        <p:spPr>
+          <a:xfrm>
+            <a:off x="2120860" y="1349388"/>
+            <a:ext cx="4127541" cy="1140696"/>
+          </a:xfrm>
+          <a:prstGeom prst="rect">
+            <a:avLst/>
+          </a:prstGeom>
+        </p:spPr>
+        <p:txBody>
+          <a:bodyPr vert="horz" lIns="0" tIns="45720" rIns="0" bIns="45720" rtlCol="0" anchor="t">
+            <a:noAutofit/>
+          </a:bodyPr>
+          <a:lstStyle>
+            <a:lvl1pPr algn="l" defTabSz="914377" rtl="0" eaLnBrk="1" latinLnBrk="0" hangingPunct="1">
+              <a:lnSpc>
+                <a:spcPct val="90000"/>
+              </a:lnSpc>
+              <a:spcBef>
+                <a:spcPct val="0"/>
+              </a:spcBef>
+              <a:buNone/>
+              <a:defRPr sz="3200" b="0" i="0" kern="1200" spc="600">
+                <a:solidFill>
+                  <a:schemeClr val="tx1"/>
+                </a:solidFill>
+                <a:latin typeface="Cinzel" charset="0"/>
+                <a:ea typeface="Cinzel" charset="0"/>
+                <a:cs typeface="Cinzel" charset="0"/>
+              </a:defRPr>
+            </a:lvl1pPr>
+          </a:lstStyle>
+          <a:p>
+            <a:r>
               <a:rPr lang="zh-TW" altLang="en-US" sz="4400" b="1" spc="300" dirty="0">
                 <a:solidFill>
                   <a:schemeClr val="tx1">
@@ -9312,13 +11599,13 @@
   <p:clrMapOvr>
     <a:masterClrMapping/>
   </p:clrMapOvr>
-  <mc:AlternateContent xmlns:mc="http://schemas.openxmlformats.org/markup-compatibility/2006">
-    <mc:Choice xmlns:p14="http://schemas.microsoft.com/office/powerpoint/2010/main" Requires="p14">
+  <mc:AlternateContent xmlns:mc="http://schemas.openxmlformats.org/markup-compatibility/2006" xmlns:p14="http://schemas.microsoft.com/office/powerpoint/2010/main">
+    <mc:Choice Requires="p14">
       <p:transition spd="med" p14:dur="700">
         <p:fade/>
       </p:transition>
     </mc:Choice>
-    <mc:Fallback>
+    <mc:Fallback xmlns="">
       <p:transition spd="med">
         <p:fade/>
       </p:transition>
@@ -9327,7 +11614,7 @@
 </p:sld>
 </file>
 
-<file path=ppt/slides/slide21.xml><?xml version="1.0" encoding="utf-8"?>
+<file path=ppt/slides/slide29.xml><?xml version="1.0" encoding="utf-8"?>
 <p:sld xmlns:a="http://schemas.openxmlformats.org/drawingml/2006/main" xmlns:r="http://schemas.openxmlformats.org/officeDocument/2006/relationships" xmlns:p="http://schemas.openxmlformats.org/presentationml/2006/main">
   <p:cSld>
     <p:spTree>
@@ -10032,13 +12319,13 @@
   <p:clrMapOvr>
     <a:masterClrMapping/>
   </p:clrMapOvr>
-  <mc:AlternateContent xmlns:mc="http://schemas.openxmlformats.org/markup-compatibility/2006">
-    <mc:Choice xmlns:p14="http://schemas.microsoft.com/office/powerpoint/2010/main" Requires="p14">
+  <mc:AlternateContent xmlns:mc="http://schemas.openxmlformats.org/markup-compatibility/2006" xmlns:p14="http://schemas.microsoft.com/office/powerpoint/2010/main">
+    <mc:Choice Requires="p14">
       <p:transition spd="med" p14:dur="700">
         <p:fade/>
       </p:transition>
     </mc:Choice>
-    <mc:Fallback>
+    <mc:Fallback xmlns="">
       <p:transition spd="med">
         <p:fade/>
       </p:transition>
@@ -13919,13 +16206,13 @@
   <p:clrMapOvr>
     <a:masterClrMapping/>
   </p:clrMapOvr>
-  <mc:AlternateContent xmlns:mc="http://schemas.openxmlformats.org/markup-compatibility/2006">
-    <mc:Choice xmlns:p14="http://schemas.microsoft.com/office/powerpoint/2010/main" Requires="p14">
+  <mc:AlternateContent xmlns:mc="http://schemas.openxmlformats.org/markup-compatibility/2006" xmlns:p14="http://schemas.microsoft.com/office/powerpoint/2010/main">
+    <mc:Choice Requires="p14">
       <p:transition spd="med" p14:dur="700">
         <p:fade/>
       </p:transition>
     </mc:Choice>
-    <mc:Fallback>
+    <mc:Fallback xmlns="">
       <p:transition spd="med">
         <p:fade/>
       </p:transition>
@@ -17336,13 +19623,13 @@
   <p:clrMapOvr>
     <a:masterClrMapping/>
   </p:clrMapOvr>
-  <mc:AlternateContent xmlns:mc="http://schemas.openxmlformats.org/markup-compatibility/2006">
-    <mc:Choice xmlns:p14="http://schemas.microsoft.com/office/powerpoint/2010/main" Requires="p14">
+  <mc:AlternateContent xmlns:mc="http://schemas.openxmlformats.org/markup-compatibility/2006" xmlns:p14="http://schemas.microsoft.com/office/powerpoint/2010/main">
+    <mc:Choice Requires="p14">
       <p:transition spd="med" p14:dur="700">
         <p:fade/>
       </p:transition>
     </mc:Choice>
-    <mc:Fallback>
+    <mc:Fallback xmlns="">
       <p:transition spd="med">
         <p:fade/>
       </p:transition>
@@ -21371,13 +23658,13 @@
   <p:clrMapOvr>
     <a:masterClrMapping/>
   </p:clrMapOvr>
-  <mc:AlternateContent xmlns:mc="http://schemas.openxmlformats.org/markup-compatibility/2006">
-    <mc:Choice xmlns:p14="http://schemas.microsoft.com/office/powerpoint/2010/main" Requires="p14">
+  <mc:AlternateContent xmlns:mc="http://schemas.openxmlformats.org/markup-compatibility/2006" xmlns:p14="http://schemas.microsoft.com/office/powerpoint/2010/main">
+    <mc:Choice Requires="p14">
       <p:transition spd="med" p14:dur="700">
         <p:fade/>
       </p:transition>
     </mc:Choice>
-    <mc:Fallback>
+    <mc:Fallback xmlns="">
       <p:transition spd="med">
         <p:fade/>
       </p:transition>
@@ -21568,7 +23855,7 @@
           <p:nvPr/>
         </p:nvPicPr>
         <p:blipFill>
-          <a:blip r:embed="rId4">
+          <a:blip r:embed="rId3">
             <a:extLst>
               <a:ext uri="{28A0092B-C50C-407E-A947-70E740481C1C}">
                 <a14:useLocalDpi xmlns:a14="http://schemas.microsoft.com/office/drawing/2010/main" val="0"/>
@@ -21637,6 +23924,147 @@
           </a:p>
         </p:txBody>
       </p:sp>
+      <p:pic>
+        <p:nvPicPr>
+          <p:cNvPr id="9219" name="Picture 3" descr="F1.large">
+            <a:extLst>
+              <a:ext uri="{FF2B5EF4-FFF2-40B4-BE49-F238E27FC236}">
+                <a16:creationId xmlns:a16="http://schemas.microsoft.com/office/drawing/2014/main" id="{4F1EB5B0-5F56-4F8A-AA47-9B65520327A0}"/>
+              </a:ext>
+            </a:extLst>
+          </p:cNvPr>
+          <p:cNvPicPr>
+            <a:picLocks noChangeAspect="1" noChangeArrowheads="1"/>
+          </p:cNvPicPr>
+          <p:nvPr/>
+        </p:nvPicPr>
+        <p:blipFill>
+          <a:blip r:embed="rId3">
+            <a:extLst>
+              <a:ext uri="{28A0092B-C50C-407E-A947-70E740481C1C}">
+                <a14:useLocalDpi xmlns:a14="http://schemas.microsoft.com/office/drawing/2010/main" val="0"/>
+              </a:ext>
+            </a:extLst>
+          </a:blip>
+          <a:srcRect/>
+          <a:stretch>
+            <a:fillRect/>
+          </a:stretch>
+        </p:blipFill>
+        <p:spPr bwMode="auto">
+          <a:xfrm>
+            <a:off x="0" y="0"/>
+            <a:ext cx="12192000" cy="4743450"/>
+          </a:xfrm>
+          <a:prstGeom prst="rect">
+            <a:avLst/>
+          </a:prstGeom>
+          <a:noFill/>
+          <a:extLst>
+            <a:ext uri="{909E8E84-426E-40DD-AFC4-6F175D3DCCD1}">
+              <a14:hiddenFill xmlns:a14="http://schemas.microsoft.com/office/drawing/2010/main">
+                <a:solidFill>
+                  <a:srgbClr val="FFFFFF"/>
+                </a:solidFill>
+              </a14:hiddenFill>
+            </a:ext>
+          </a:extLst>
+        </p:spPr>
+      </p:pic>
+      <p:pic>
+        <p:nvPicPr>
+          <p:cNvPr id="9221" name="Picture 5" descr="F1.large">
+            <a:extLst>
+              <a:ext uri="{FF2B5EF4-FFF2-40B4-BE49-F238E27FC236}">
+                <a16:creationId xmlns:a16="http://schemas.microsoft.com/office/drawing/2014/main" id="{FCA78567-D8AD-4828-8A55-5E09C951EB2A}"/>
+              </a:ext>
+            </a:extLst>
+          </p:cNvPr>
+          <p:cNvPicPr>
+            <a:picLocks noChangeAspect="1" noChangeArrowheads="1"/>
+          </p:cNvPicPr>
+          <p:nvPr/>
+        </p:nvPicPr>
+        <p:blipFill>
+          <a:blip r:embed="rId3">
+            <a:extLst>
+              <a:ext uri="{28A0092B-C50C-407E-A947-70E740481C1C}">
+                <a14:useLocalDpi xmlns:a14="http://schemas.microsoft.com/office/drawing/2010/main" val="0"/>
+              </a:ext>
+            </a:extLst>
+          </a:blip>
+          <a:srcRect/>
+          <a:stretch>
+            <a:fillRect/>
+          </a:stretch>
+        </p:blipFill>
+        <p:spPr bwMode="auto">
+          <a:xfrm>
+            <a:off x="0" y="0"/>
+            <a:ext cx="12192000" cy="4743450"/>
+          </a:xfrm>
+          <a:prstGeom prst="rect">
+            <a:avLst/>
+          </a:prstGeom>
+          <a:noFill/>
+          <a:extLst>
+            <a:ext uri="{909E8E84-426E-40DD-AFC4-6F175D3DCCD1}">
+              <a14:hiddenFill xmlns:a14="http://schemas.microsoft.com/office/drawing/2010/main">
+                <a:solidFill>
+                  <a:srgbClr val="FFFFFF"/>
+                </a:solidFill>
+              </a14:hiddenFill>
+            </a:ext>
+          </a:extLst>
+        </p:spPr>
+      </p:pic>
+      <p:pic>
+        <p:nvPicPr>
+          <p:cNvPr id="9223" name="Picture 7" descr="F1.large">
+            <a:extLst>
+              <a:ext uri="{FF2B5EF4-FFF2-40B4-BE49-F238E27FC236}">
+                <a16:creationId xmlns:a16="http://schemas.microsoft.com/office/drawing/2014/main" id="{50DDE24B-CBAE-4FBA-927E-D4DE2D3FE270}"/>
+              </a:ext>
+            </a:extLst>
+          </p:cNvPr>
+          <p:cNvPicPr>
+            <a:picLocks noChangeAspect="1" noChangeArrowheads="1"/>
+          </p:cNvPicPr>
+          <p:nvPr/>
+        </p:nvPicPr>
+        <p:blipFill>
+          <a:blip r:embed="rId3">
+            <a:extLst>
+              <a:ext uri="{28A0092B-C50C-407E-A947-70E740481C1C}">
+                <a14:useLocalDpi xmlns:a14="http://schemas.microsoft.com/office/drawing/2010/main" val="0"/>
+              </a:ext>
+            </a:extLst>
+          </a:blip>
+          <a:srcRect/>
+          <a:stretch>
+            <a:fillRect/>
+          </a:stretch>
+        </p:blipFill>
+        <p:spPr bwMode="auto">
+          <a:xfrm>
+            <a:off x="0" y="0"/>
+            <a:ext cx="12192000" cy="4743450"/>
+          </a:xfrm>
+          <a:prstGeom prst="rect">
+            <a:avLst/>
+          </a:prstGeom>
+          <a:noFill/>
+          <a:extLst>
+            <a:ext uri="{909E8E84-426E-40DD-AFC4-6F175D3DCCD1}">
+              <a14:hiddenFill xmlns:a14="http://schemas.microsoft.com/office/drawing/2010/main">
+                <a:solidFill>
+                  <a:srgbClr val="FFFFFF"/>
+                </a:solidFill>
+              </a14:hiddenFill>
+            </a:ext>
+          </a:extLst>
+        </p:spPr>
+      </p:pic>
     </p:spTree>
     <p:extLst>
       <p:ext uri="{BB962C8B-B14F-4D97-AF65-F5344CB8AC3E}">
@@ -21647,13 +24075,13 @@
   <p:clrMapOvr>
     <a:masterClrMapping/>
   </p:clrMapOvr>
-  <mc:AlternateContent xmlns:mc="http://schemas.openxmlformats.org/markup-compatibility/2006">
-    <mc:Choice xmlns:p14="http://schemas.microsoft.com/office/powerpoint/2010/main" Requires="p14">
+  <mc:AlternateContent xmlns:mc="http://schemas.openxmlformats.org/markup-compatibility/2006" xmlns:p14="http://schemas.microsoft.com/office/powerpoint/2010/main">
+    <mc:Choice Requires="p14">
       <p:transition spd="med" p14:dur="700">
         <p:fade/>
       </p:transition>
     </mc:Choice>
-    <mc:Fallback>
+    <mc:Fallback xmlns="">
       <p:transition spd="med">
         <p:fade/>
       </p:transition>
@@ -21776,13 +24204,13 @@
   <p:clrMapOvr>
     <a:masterClrMapping/>
   </p:clrMapOvr>
-  <mc:AlternateContent xmlns:mc="http://schemas.openxmlformats.org/markup-compatibility/2006">
-    <mc:Choice xmlns:p14="http://schemas.microsoft.com/office/powerpoint/2010/main" Requires="p14">
+  <mc:AlternateContent xmlns:mc="http://schemas.openxmlformats.org/markup-compatibility/2006" xmlns:p14="http://schemas.microsoft.com/office/powerpoint/2010/main">
+    <mc:Choice Requires="p14">
       <p:transition spd="med" p14:dur="700">
         <p:fade/>
       </p:transition>
     </mc:Choice>
-    <mc:Fallback>
+    <mc:Fallback xmlns="">
       <p:transition spd="med">
         <p:fade/>
       </p:transition>
@@ -22280,13 +24708,13 @@
   <p:clrMapOvr>
     <a:masterClrMapping/>
   </p:clrMapOvr>
-  <mc:AlternateContent xmlns:mc="http://schemas.openxmlformats.org/markup-compatibility/2006">
-    <mc:Choice xmlns:p14="http://schemas.microsoft.com/office/powerpoint/2010/main" Requires="p14">
+  <mc:AlternateContent xmlns:mc="http://schemas.openxmlformats.org/markup-compatibility/2006" xmlns:p14="http://schemas.microsoft.com/office/powerpoint/2010/main">
+    <mc:Choice Requires="p14">
       <p:transition spd="med" p14:dur="700">
         <p:fade/>
       </p:transition>
     </mc:Choice>
-    <mc:Fallback>
+    <mc:Fallback xmlns="">
       <p:transition spd="med">
         <p:fade/>
       </p:transition>
@@ -23238,13 +25666,13 @@
   <p:clrMapOvr>
     <a:masterClrMapping/>
   </p:clrMapOvr>
-  <mc:AlternateContent xmlns:mc="http://schemas.openxmlformats.org/markup-compatibility/2006">
-    <mc:Choice xmlns:p14="http://schemas.microsoft.com/office/powerpoint/2010/main" Requires="p14">
+  <mc:AlternateContent xmlns:mc="http://schemas.openxmlformats.org/markup-compatibility/2006" xmlns:p14="http://schemas.microsoft.com/office/powerpoint/2010/main">
+    <mc:Choice Requires="p14">
       <p:transition spd="med" p14:dur="700">
         <p:fade/>
       </p:transition>
     </mc:Choice>
-    <mc:Fallback>
+    <mc:Fallback xmlns="">
       <p:transition spd="med">
         <p:fade/>
       </p:transition>

</xml_diff>